<commit_message>
Add TokiStorage icon to all PDF/PPTX generation scripts
- generate-patronage-docs.py: icon in header_block + macOS font detection
- generate-government-docs.py: icon in header_block + macOS font detection
- generate-deck.py: icon on cover slide (top-right) + graceful LibreOffice skip
- generate-client-deck.py: icon on cover slide (top-right) + graceful LibreOffice skip
- Regenerated: 7 PDFs (patronage×3, government×4) + 4 PPTXs (deck×2, client-deck×2)

Co-Authored-By: Claude Opus 4.6 <noreply@anthropic.com>
</commit_message>
<xml_diff>
--- a/tokistorage-client-deck-en.pptx
+++ b/tokistorage-client-deck-en.pptx
@@ -14,6 +14,7 @@
     <p:sldId id="262" r:id="rId13"/>
     <p:sldId id="263" r:id="rId14"/>
     <p:sldId id="264" r:id="rId15"/>
+    <p:sldId id="265" r:id="rId16"/>
   </p:sldIdLst>
   <p:sldSz cx="9144000" cy="5143500" type="screen4x3"/>
   <p:notesSz cx="6858000" cy="9144000"/>
@@ -3182,9 +3183,33 @@
           </a:p>
         </p:txBody>
       </p:sp>
-      <p:sp>
-        <p:nvSpPr>
-          <p:cNvPr id="4" name="TextBox 3"/>
+      <p:pic>
+        <p:nvPicPr>
+          <p:cNvPr id="4" name="Picture 3" descr="tokistorage-icon-circle.png"/>
+          <p:cNvPicPr>
+            <a:picLocks noChangeAspect="1"/>
+          </p:cNvPicPr>
+          <p:nvPr/>
+        </p:nvPicPr>
+        <p:blipFill>
+          <a:blip r:embed="rId2"/>
+          <a:stretch>
+            <a:fillRect/>
+          </a:stretch>
+        </p:blipFill>
+        <p:spPr>
+          <a:xfrm>
+            <a:off x="7680960" y="365760"/>
+            <a:ext cx="914400" cy="914400"/>
+          </a:xfrm>
+          <a:prstGeom prst="rect">
+            <a:avLst/>
+          </a:prstGeom>
+        </p:spPr>
+      </p:pic>
+      <p:sp>
+        <p:nvSpPr>
+          <p:cNvPr id="5" name="TextBox 4"/>
           <p:cNvSpPr txBox="1"/>
           <p:nvPr/>
         </p:nvSpPr>
@@ -3227,7 +3252,7 @@
       </p:sp>
       <p:sp>
         <p:nvSpPr>
-          <p:cNvPr id="5" name="TextBox 4"/>
+          <p:cNvPr id="6" name="TextBox 5"/>
           <p:cNvSpPr txBox="1"/>
           <p:nvPr/>
         </p:nvSpPr>
@@ -3271,7 +3296,7 @@
       </p:sp>
       <p:sp>
         <p:nvSpPr>
-          <p:cNvPr id="6" name="TextBox 5"/>
+          <p:cNvPr id="7" name="TextBox 6"/>
           <p:cNvSpPr txBox="1"/>
           <p:nvPr/>
         </p:nvSpPr>
@@ -3315,7 +3340,7 @@
       </p:sp>
       <p:sp>
         <p:nvSpPr>
-          <p:cNvPr id="7" name="Rectangle 6"/>
+          <p:cNvPr id="8" name="Rectangle 7"/>
           <p:cNvSpPr/>
           <p:nvPr/>
         </p:nvSpPr>
@@ -3358,7 +3383,7 @@
       </p:sp>
       <p:sp>
         <p:nvSpPr>
-          <p:cNvPr id="8" name="TextBox 7"/>
+          <p:cNvPr id="9" name="TextBox 8"/>
           <p:cNvSpPr txBox="1"/>
           <p:nvPr/>
         </p:nvSpPr>
@@ -3401,7 +3426,7 @@
       </p:sp>
       <p:sp>
         <p:nvSpPr>
-          <p:cNvPr id="9" name="TextBox 8"/>
+          <p:cNvPr id="10" name="TextBox 9"/>
           <p:cNvSpPr txBox="1"/>
           <p:nvPr/>
         </p:nvSpPr>
@@ -3444,7 +3469,7 @@
       </p:sp>
       <p:sp>
         <p:nvSpPr>
-          <p:cNvPr id="10" name="TextBox 9"/>
+          <p:cNvPr id="11" name="TextBox 10"/>
           <p:cNvSpPr txBox="1"/>
           <p:nvPr/>
         </p:nvSpPr>
@@ -3481,6 +3506,413 @@
                 <a:latin typeface="Calibri"/>
               </a:rPr>
               <a:t>Confidential</a:t>
+            </a:r>
+          </a:p>
+        </p:txBody>
+      </p:sp>
+    </p:spTree>
+  </p:cSld>
+  <p:clrMapOvr>
+    <a:masterClrMapping/>
+  </p:clrMapOvr>
+</p:sld>
+</file>
+
+<file path=ppt/slides/slide10.xml><?xml version="1.0" encoding="utf-8"?>
+<p:sld xmlns:a="http://schemas.openxmlformats.org/drawingml/2006/main" xmlns:p="http://schemas.openxmlformats.org/presentationml/2006/main" xmlns:r="http://schemas.openxmlformats.org/officeDocument/2006/relationships">
+  <p:cSld>
+    <p:spTree>
+      <p:nvGrpSpPr>
+        <p:cNvPr id="1" name=""/>
+        <p:cNvGrpSpPr/>
+        <p:nvPr/>
+      </p:nvGrpSpPr>
+      <p:grpSpPr/>
+      <p:sp>
+        <p:nvSpPr>
+          <p:cNvPr id="2" name="Rectangle 1"/>
+          <p:cNvSpPr/>
+          <p:nvPr/>
+        </p:nvSpPr>
+        <p:spPr>
+          <a:xfrm>
+            <a:off x="0" y="0"/>
+            <a:ext cx="9144000" cy="5143500"/>
+          </a:xfrm>
+          <a:prstGeom prst="rect">
+            <a:avLst/>
+          </a:prstGeom>
+          <a:solidFill>
+            <a:srgbClr val="F8FAFC"/>
+          </a:solidFill>
+          <a:ln>
+            <a:noFill/>
+          </a:ln>
+        </p:spPr>
+        <p:style>
+          <a:lnRef idx="1">
+            <a:schemeClr val="accent1"/>
+          </a:lnRef>
+          <a:fillRef idx="3">
+            <a:schemeClr val="accent1"/>
+          </a:fillRef>
+          <a:effectRef idx="2">
+            <a:schemeClr val="accent1"/>
+          </a:effectRef>
+          <a:fontRef idx="minor">
+            <a:schemeClr val="lt1"/>
+          </a:fontRef>
+        </p:style>
+        <p:txBody>
+          <a:bodyPr rtlCol="0" anchor="ctr"/>
+          <a:lstStyle/>
+          <a:p>
+            <a:pPr algn="ctr"/>
+          </a:p>
+        </p:txBody>
+      </p:sp>
+      <p:sp>
+        <p:nvSpPr>
+          <p:cNvPr id="3" name="TextBox 2"/>
+          <p:cNvSpPr txBox="1"/>
+          <p:nvPr/>
+        </p:nvSpPr>
+        <p:spPr>
+          <a:xfrm>
+            <a:off x="914400" y="914400"/>
+            <a:ext cx="7315200" cy="411480"/>
+          </a:xfrm>
+          <a:prstGeom prst="rect">
+            <a:avLst/>
+          </a:prstGeom>
+          <a:noFill/>
+        </p:spPr>
+        <p:txBody>
+          <a:bodyPr wrap="square"/>
+          <a:lstStyle/>
+          <a:p>
+            <a:pPr algn="l">
+              <a:lnSpc>
+                <a:spcPct val="135000"/>
+              </a:lnSpc>
+              <a:spcBef>
+                <a:spcPts val="0"/>
+              </a:spcBef>
+              <a:spcAft>
+                <a:spcPts val="0"/>
+              </a:spcAft>
+            </a:pPr>
+            <a:r>
+              <a:rPr sz="1400" b="1">
+                <a:solidFill>
+                  <a:srgbClr val="94A3B8"/>
+                </a:solidFill>
+                <a:latin typeface="Calibri"/>
+              </a:rPr>
+              <a:t>Confidential / Disclaimer</a:t>
+            </a:r>
+          </a:p>
+        </p:txBody>
+      </p:sp>
+      <p:sp>
+        <p:nvSpPr>
+          <p:cNvPr id="4" name="Rectangle 3"/>
+          <p:cNvSpPr/>
+          <p:nvPr/>
+        </p:nvSpPr>
+        <p:spPr>
+          <a:xfrm>
+            <a:off x="914400" y="1371600"/>
+            <a:ext cx="7315200" cy="6350"/>
+          </a:xfrm>
+          <a:prstGeom prst="rect">
+            <a:avLst/>
+          </a:prstGeom>
+          <a:solidFill>
+            <a:srgbClr val="E2E8F0"/>
+          </a:solidFill>
+          <a:ln>
+            <a:noFill/>
+          </a:ln>
+        </p:spPr>
+        <p:style>
+          <a:lnRef idx="1">
+            <a:schemeClr val="accent1"/>
+          </a:lnRef>
+          <a:fillRef idx="3">
+            <a:schemeClr val="accent1"/>
+          </a:fillRef>
+          <a:effectRef idx="2">
+            <a:schemeClr val="accent1"/>
+          </a:effectRef>
+          <a:fontRef idx="minor">
+            <a:schemeClr val="lt1"/>
+          </a:fontRef>
+        </p:style>
+        <p:txBody>
+          <a:bodyPr rtlCol="0" anchor="ctr"/>
+          <a:lstStyle/>
+          <a:p>
+            <a:pPr algn="ctr"/>
+          </a:p>
+        </p:txBody>
+      </p:sp>
+      <p:sp>
+        <p:nvSpPr>
+          <p:cNvPr id="5" name="TextBox 4"/>
+          <p:cNvSpPr txBox="1"/>
+          <p:nvPr/>
+        </p:nvSpPr>
+        <p:spPr>
+          <a:xfrm>
+            <a:off x="914400" y="1554480"/>
+            <a:ext cx="7315200" cy="2560320"/>
+          </a:xfrm>
+          <a:prstGeom prst="rect">
+            <a:avLst/>
+          </a:prstGeom>
+          <a:noFill/>
+        </p:spPr>
+        <p:txBody>
+          <a:bodyPr wrap="square"/>
+          <a:lstStyle/>
+          <a:p>
+            <a:pPr algn="l">
+              <a:lnSpc>
+                <a:spcPct val="135000"/>
+              </a:lnSpc>
+              <a:spcBef>
+                <a:spcPts val="0"/>
+              </a:spcBef>
+              <a:spcAft>
+                <a:spcPts val="0"/>
+              </a:spcAft>
+            </a:pPr>
+            <a:r>
+              <a:rPr sz="900" b="0">
+                <a:solidFill>
+                  <a:srgbClr val="475569"/>
+                </a:solidFill>
+                <a:latin typeface="Calibri"/>
+              </a:rPr>
+              <a:t>This document has been prepared by TokiStorage (Takuya Sato) for the purpose of introducing our consulting services.
+The information contained herein reflects current views and plans and does not constitute a guarantee of accuracy, completeness, or future outcomes.
+This document is provided for informational purposes only and does not constitute legal, investment, or other professional advice.</a:t>
+            </a:r>
+          </a:p>
+        </p:txBody>
+      </p:sp>
+      <p:sp>
+        <p:nvSpPr>
+          <p:cNvPr id="6" name="TextBox 5"/>
+          <p:cNvSpPr txBox="1"/>
+          <p:nvPr/>
+        </p:nvSpPr>
+        <p:spPr>
+          <a:xfrm>
+            <a:off x="914400" y="4046220"/>
+            <a:ext cx="7315200" cy="274320"/>
+          </a:xfrm>
+          <a:prstGeom prst="rect">
+            <a:avLst/>
+          </a:prstGeom>
+          <a:noFill/>
+        </p:spPr>
+        <p:txBody>
+          <a:bodyPr wrap="square"/>
+          <a:lstStyle/>
+          <a:p>
+            <a:pPr algn="l">
+              <a:lnSpc>
+                <a:spcPct val="135000"/>
+              </a:lnSpc>
+              <a:spcBef>
+                <a:spcPts val="0"/>
+              </a:spcBef>
+              <a:spcAft>
+                <a:spcPts val="0"/>
+              </a:spcAft>
+            </a:pPr>
+            <a:r>
+              <a:rPr sz="800" b="0">
+                <a:solidFill>
+                  <a:srgbClr val="94A3B8"/>
+                </a:solidFill>
+                <a:latin typeface="Calibri"/>
+              </a:rPr>
+              <a:t>© 2026 TokiStorage / Takuya Sato. All rights reserved.</a:t>
+            </a:r>
+          </a:p>
+        </p:txBody>
+      </p:sp>
+      <p:sp>
+        <p:nvSpPr>
+          <p:cNvPr id="7" name="Rectangle 6"/>
+          <p:cNvSpPr/>
+          <p:nvPr/>
+        </p:nvSpPr>
+        <p:spPr>
+          <a:xfrm>
+            <a:off x="0" y="4796028"/>
+            <a:ext cx="9144000" cy="6350"/>
+          </a:xfrm>
+          <a:prstGeom prst="rect">
+            <a:avLst/>
+          </a:prstGeom>
+          <a:solidFill>
+            <a:srgbClr val="E2E8F0"/>
+          </a:solidFill>
+          <a:ln>
+            <a:noFill/>
+          </a:ln>
+        </p:spPr>
+        <p:style>
+          <a:lnRef idx="1">
+            <a:schemeClr val="accent1"/>
+          </a:lnRef>
+          <a:fillRef idx="3">
+            <a:schemeClr val="accent1"/>
+          </a:fillRef>
+          <a:effectRef idx="2">
+            <a:schemeClr val="accent1"/>
+          </a:effectRef>
+          <a:fontRef idx="minor">
+            <a:schemeClr val="lt1"/>
+          </a:fontRef>
+        </p:style>
+        <p:txBody>
+          <a:bodyPr rtlCol="0" anchor="ctr"/>
+          <a:lstStyle/>
+          <a:p>
+            <a:pPr algn="ctr"/>
+          </a:p>
+        </p:txBody>
+      </p:sp>
+      <p:sp>
+        <p:nvSpPr>
+          <p:cNvPr id="8" name="TextBox 7"/>
+          <p:cNvSpPr txBox="1"/>
+          <p:nvPr/>
+        </p:nvSpPr>
+        <p:spPr>
+          <a:xfrm>
+            <a:off x="457200" y="4821428"/>
+            <a:ext cx="3657600" cy="274320"/>
+          </a:xfrm>
+          <a:prstGeom prst="rect">
+            <a:avLst/>
+          </a:prstGeom>
+          <a:noFill/>
+        </p:spPr>
+        <p:txBody>
+          <a:bodyPr wrap="square"/>
+          <a:lstStyle/>
+          <a:p>
+            <a:pPr algn="l">
+              <a:lnSpc>
+                <a:spcPct val="135000"/>
+              </a:lnSpc>
+              <a:spcBef>
+                <a:spcPts val="0"/>
+              </a:spcBef>
+              <a:spcAft>
+                <a:spcPts val="0"/>
+              </a:spcAft>
+            </a:pPr>
+            <a:r>
+              <a:rPr sz="900" b="0">
+                <a:solidFill>
+                  <a:srgbClr val="94A3B8"/>
+                </a:solidFill>
+                <a:latin typeface="Calibri"/>
+              </a:rPr>
+              <a:t>TokiStorage</a:t>
+            </a:r>
+          </a:p>
+        </p:txBody>
+      </p:sp>
+      <p:sp>
+        <p:nvSpPr>
+          <p:cNvPr id="9" name="TextBox 8"/>
+          <p:cNvSpPr txBox="1"/>
+          <p:nvPr/>
+        </p:nvSpPr>
+        <p:spPr>
+          <a:xfrm>
+            <a:off x="3657600" y="4821428"/>
+            <a:ext cx="1828800" cy="274320"/>
+          </a:xfrm>
+          <a:prstGeom prst="rect">
+            <a:avLst/>
+          </a:prstGeom>
+          <a:noFill/>
+        </p:spPr>
+        <p:txBody>
+          <a:bodyPr wrap="square"/>
+          <a:lstStyle/>
+          <a:p>
+            <a:pPr algn="ctr">
+              <a:lnSpc>
+                <a:spcPct val="135000"/>
+              </a:lnSpc>
+              <a:spcBef>
+                <a:spcPts val="0"/>
+              </a:spcBef>
+              <a:spcAft>
+                <a:spcPts val="0"/>
+              </a:spcAft>
+            </a:pPr>
+            <a:r>
+              <a:rPr sz="900" b="0">
+                <a:solidFill>
+                  <a:srgbClr val="94A3B8"/>
+                </a:solidFill>
+                <a:latin typeface="Calibri"/>
+              </a:rPr>
+              <a:t>Confidential</a:t>
+            </a:r>
+          </a:p>
+        </p:txBody>
+      </p:sp>
+      <p:sp>
+        <p:nvSpPr>
+          <p:cNvPr id="10" name="TextBox 9"/>
+          <p:cNvSpPr txBox="1"/>
+          <p:nvPr/>
+        </p:nvSpPr>
+        <p:spPr>
+          <a:xfrm>
+            <a:off x="8229600" y="4821428"/>
+            <a:ext cx="457200" cy="274320"/>
+          </a:xfrm>
+          <a:prstGeom prst="rect">
+            <a:avLst/>
+          </a:prstGeom>
+          <a:noFill/>
+        </p:spPr>
+        <p:txBody>
+          <a:bodyPr wrap="square"/>
+          <a:lstStyle/>
+          <a:p>
+            <a:pPr algn="r">
+              <a:lnSpc>
+                <a:spcPct val="135000"/>
+              </a:lnSpc>
+              <a:spcBef>
+                <a:spcPts val="0"/>
+              </a:spcBef>
+              <a:spcAft>
+                <a:spcPts val="0"/>
+              </a:spcAft>
+            </a:pPr>
+            <a:r>
+              <a:rPr sz="900" b="1">
+                <a:solidFill>
+                  <a:srgbClr val="94A3B8"/>
+                </a:solidFill>
+                <a:latin typeface="Calibri"/>
+              </a:rPr>
+              <a:t>10</a:t>
             </a:r>
           </a:p>
         </p:txBody>
@@ -8595,7 +9027,7 @@
                 </a:solidFill>
                 <a:latin typeface="Calibri"/>
               </a:rPr>
-              <a:t>Quartz Glass Proof of Existence</a:t>
+              <a:t>Three-Layer Distributed Proof of Existence</a:t>
             </a:r>
           </a:p>
         </p:txBody>
@@ -8638,7 +9070,7 @@
                 </a:solidFill>
                 <a:latin typeface="Calibri"/>
               </a:rPr>
-              <a:t>Your story inscribed in quartz glass. No servers, no power needed. Guaranteed for 1,000 years. QR code readable by any smartphone.</a:t>
+              <a:t>Physical (quartz glass/laminate), National (National Diet Library legal deposit), Private (GitHub). Fully 3-2-1 compliant. Zero single points of failure.</a:t>
             </a:r>
           </a:p>
         </p:txBody>
@@ -9348,7 +9780,7 @@
                 </a:solidFill>
                 <a:latin typeface="Calibri"/>
               </a:rPr>
-              <a:t>The person who engages your story with a millennium perspective — your dialogue partner</a:t>
+              <a:t>Starting from ¥5,000 ($33) — begin in whatever way feels right for you</a:t>
             </a:r>
           </a:p>
         </p:txBody>
@@ -9391,137 +9823,27 @@
                 </a:solidFill>
                 <a:latin typeface="Calibri"/>
               </a:rPr>
-              <a:t>YOUR PARTNER</a:t>
-            </a:r>
-          </a:p>
-        </p:txBody>
-      </p:sp>
-      <p:pic>
-        <p:nvPicPr>
-          <p:cNvPr id="5" name="Picture 4" descr="_client_deck_profile.png"/>
-          <p:cNvPicPr>
-            <a:picLocks noChangeAspect="1"/>
-          </p:cNvPicPr>
-          <p:nvPr/>
-        </p:nvPicPr>
-        <p:blipFill>
-          <a:blip r:embed="rId2"/>
-          <a:stretch>
-            <a:fillRect/>
-          </a:stretch>
-        </p:blipFill>
-        <p:spPr>
-          <a:xfrm>
-            <a:off x="457200" y="1024128"/>
-            <a:ext cx="914400" cy="914400"/>
-          </a:xfrm>
-          <a:prstGeom prst="rect">
-            <a:avLst/>
-          </a:prstGeom>
-        </p:spPr>
-      </p:pic>
-      <p:sp>
-        <p:nvSpPr>
-          <p:cNvPr id="6" name="TextBox 5"/>
-          <p:cNvSpPr txBox="1"/>
-          <p:nvPr/>
-        </p:nvSpPr>
-        <p:spPr>
-          <a:xfrm>
-            <a:off x="1508760" y="1078992"/>
-            <a:ext cx="6675120" cy="320040"/>
-          </a:xfrm>
-          <a:prstGeom prst="rect">
-            <a:avLst/>
-          </a:prstGeom>
-          <a:noFill/>
-        </p:spPr>
-        <p:txBody>
-          <a:bodyPr wrap="square"/>
-          <a:lstStyle/>
-          <a:p>
-            <a:pPr algn="l">
-              <a:lnSpc>
-                <a:spcPct val="135000"/>
-              </a:lnSpc>
-              <a:spcBef>
-                <a:spcPts val="0"/>
-              </a:spcBef>
-              <a:spcAft>
-                <a:spcPts val="0"/>
-              </a:spcAft>
-            </a:pPr>
-            <a:r>
-              <a:rPr sz="1300" b="1">
-                <a:solidFill>
-                  <a:srgbClr val="1E293B"/>
-                </a:solidFill>
-                <a:latin typeface="Calibri"/>
-              </a:rPr>
-              <a:t>Takuya Sato — Founder, TokiStorage</a:t>
-            </a:r>
-          </a:p>
-        </p:txBody>
-      </p:sp>
-      <p:sp>
-        <p:nvSpPr>
-          <p:cNvPr id="7" name="TextBox 6"/>
-          <p:cNvSpPr txBox="1"/>
-          <p:nvPr/>
-        </p:nvSpPr>
-        <p:spPr>
-          <a:xfrm>
-            <a:off x="1508760" y="1444752"/>
-            <a:ext cx="6675120" cy="1097280"/>
-          </a:xfrm>
-          <a:prstGeom prst="rect">
-            <a:avLst/>
-          </a:prstGeom>
-          <a:noFill/>
-        </p:spPr>
-        <p:txBody>
-          <a:bodyPr wrap="square"/>
-          <a:lstStyle/>
-          <a:p>
-            <a:pPr algn="l">
-              <a:lnSpc>
-                <a:spcPct val="135000"/>
-              </a:lnSpc>
-              <a:spcBef>
-                <a:spcPts val="0"/>
-              </a:spcBef>
-              <a:spcAft>
-                <a:spcPts val="0"/>
-              </a:spcAft>
-            </a:pPr>
-            <a:r>
-              <a:rPr sz="900" b="0">
-                <a:solidFill>
-                  <a:srgbClr val="475569"/>
-                </a:solidFill>
-                <a:latin typeface="Calibri"/>
-              </a:rPr>
-              <a:t>Former Big Four consultant — understands executive dialogue and strategic thinking from the inside. 20+ years in semiconductor manufacturing engineering. Former president of Timeless Town Shin-Urayasu residents' association (250 households). Through SoulCarrier's work with unclaimed graves, witnessed firsthand how memories vanish — and conceived TokiStorage. Validated off-grid, institution-free 1,000-year design through testing in Maui and Lake Yamanakako. Author of 70+ philosophical essays exploring proof of existence across 9 intellectual domains.</a:t>
-            </a:r>
-          </a:p>
-        </p:txBody>
-      </p:sp>
-      <p:sp>
-        <p:nvSpPr>
-          <p:cNvPr id="8" name="Rectangle 7"/>
+              <a:t>INVESTMENT GUIDE</a:t>
+            </a:r>
+          </a:p>
+        </p:txBody>
+      </p:sp>
+      <p:sp>
+        <p:nvSpPr>
+          <p:cNvPr id="5" name="Rectangle 4"/>
           <p:cNvSpPr/>
           <p:nvPr/>
         </p:nvSpPr>
         <p:spPr>
           <a:xfrm>
-            <a:off x="457200" y="2651760"/>
-            <a:ext cx="1440180" cy="347472"/>
+            <a:off x="457200" y="1097280"/>
+            <a:ext cx="7863840" cy="804672"/>
           </a:xfrm>
           <a:prstGeom prst="rect">
             <a:avLst/>
           </a:prstGeom>
           <a:solidFill>
-            <a:srgbClr val="F1F5F9"/>
+            <a:srgbClr val="FFFFFF"/>
           </a:solidFill>
           <a:ln w="9525">
             <a:solidFill>
@@ -9553,43 +9875,172 @@
       </p:sp>
       <p:sp>
         <p:nvSpPr>
+          <p:cNvPr id="6" name="Rectangle 5"/>
+          <p:cNvSpPr/>
+          <p:nvPr/>
+        </p:nvSpPr>
+        <p:spPr>
+          <a:xfrm>
+            <a:off x="594360" y="1234440"/>
+            <a:ext cx="457200" cy="457200"/>
+          </a:xfrm>
+          <a:prstGeom prst="rect">
+            <a:avLst/>
+          </a:prstGeom>
+          <a:solidFill>
+            <a:srgbClr val="EFF6FF"/>
+          </a:solidFill>
+          <a:ln>
+            <a:noFill/>
+          </a:ln>
+        </p:spPr>
+        <p:style>
+          <a:lnRef idx="1">
+            <a:schemeClr val="accent1"/>
+          </a:lnRef>
+          <a:fillRef idx="3">
+            <a:schemeClr val="accent1"/>
+          </a:fillRef>
+          <a:effectRef idx="2">
+            <a:schemeClr val="accent1"/>
+          </a:effectRef>
+          <a:fontRef idx="minor">
+            <a:schemeClr val="lt1"/>
+          </a:fontRef>
+        </p:style>
+        <p:txBody>
+          <a:bodyPr rtlCol="0" anchor="ctr"/>
+          <a:lstStyle/>
+          <a:p>
+            <a:pPr algn="ctr"/>
+          </a:p>
+        </p:txBody>
+      </p:sp>
+      <p:sp>
+        <p:nvSpPr>
+          <p:cNvPr id="7" name="TextBox 6"/>
+          <p:cNvSpPr txBox="1"/>
+          <p:nvPr/>
+        </p:nvSpPr>
+        <p:spPr>
+          <a:xfrm>
+            <a:off x="594360" y="1234440"/>
+            <a:ext cx="457200" cy="457200"/>
+          </a:xfrm>
+          <a:prstGeom prst="rect">
+            <a:avLst/>
+          </a:prstGeom>
+          <a:noFill/>
+        </p:spPr>
+        <p:txBody>
+          <a:bodyPr wrap="square" anchor="ctr"/>
+          <a:lstStyle/>
+          <a:p>
+            <a:pPr algn="ctr">
+              <a:lnSpc>
+                <a:spcPct val="135000"/>
+              </a:lnSpc>
+              <a:spcBef>
+                <a:spcPts val="0"/>
+              </a:spcBef>
+              <a:spcAft>
+                <a:spcPts val="0"/>
+              </a:spcAft>
+            </a:pPr>
+            <a:r>
+              <a:rPr sz="1400" b="1">
+                <a:solidFill>
+                  <a:srgbClr val="2563EB"/>
+                </a:solidFill>
+                <a:latin typeface="Calibri"/>
+              </a:rPr>
+              <a:t>T</a:t>
+            </a:r>
+          </a:p>
+        </p:txBody>
+      </p:sp>
+      <p:sp>
+        <p:nvSpPr>
+          <p:cNvPr id="8" name="TextBox 7"/>
+          <p:cNvSpPr txBox="1"/>
+          <p:nvPr/>
+        </p:nvSpPr>
+        <p:spPr>
+          <a:xfrm>
+            <a:off x="1188720" y="1207008"/>
+            <a:ext cx="6949440" cy="292608"/>
+          </a:xfrm>
+          <a:prstGeom prst="rect">
+            <a:avLst/>
+          </a:prstGeom>
+          <a:noFill/>
+        </p:spPr>
+        <p:txBody>
+          <a:bodyPr wrap="square"/>
+          <a:lstStyle/>
+          <a:p>
+            <a:pPr algn="l">
+              <a:lnSpc>
+                <a:spcPct val="135000"/>
+              </a:lnSpc>
+              <a:spcBef>
+                <a:spcPts val="0"/>
+              </a:spcBef>
+              <a:spcAft>
+                <a:spcPts val="0"/>
+              </a:spcAft>
+            </a:pPr>
+            <a:r>
+              <a:rPr sz="1100" b="1">
+                <a:solidFill>
+                  <a:srgbClr val="1E293B"/>
+                </a:solidFill>
+                <a:latin typeface="Calibri"/>
+              </a:rPr>
+              <a:t>Trial Plan — ¥5,000 ($33)</a:t>
+            </a:r>
+          </a:p>
+        </p:txBody>
+      </p:sp>
+      <p:sp>
+        <p:nvSpPr>
           <p:cNvPr id="9" name="TextBox 8"/>
           <p:cNvSpPr txBox="1"/>
           <p:nvPr/>
         </p:nvSpPr>
         <p:spPr>
           <a:xfrm>
-            <a:off x="548640" y="2651760"/>
-            <a:ext cx="1257300" cy="347472"/>
-          </a:xfrm>
-          <a:prstGeom prst="rect">
-            <a:avLst/>
-          </a:prstGeom>
-          <a:noFill/>
-        </p:spPr>
-        <p:txBody>
-          <a:bodyPr wrap="square" anchor="ctr"/>
-          <a:lstStyle/>
-          <a:p>
-            <a:pPr algn="ctr">
-              <a:lnSpc>
-                <a:spcPct val="135000"/>
-              </a:lnSpc>
-              <a:spcBef>
-                <a:spcPts val="0"/>
-              </a:spcBef>
-              <a:spcAft>
-                <a:spcPts val="0"/>
-              </a:spcAft>
-            </a:pPr>
-            <a:r>
-              <a:rPr sz="800" b="0">
+            <a:off x="1188720" y="1517904"/>
+            <a:ext cx="6949440" cy="274320"/>
+          </a:xfrm>
+          <a:prstGeom prst="rect">
+            <a:avLst/>
+          </a:prstGeom>
+          <a:noFill/>
+        </p:spPr>
+        <p:txBody>
+          <a:bodyPr wrap="square"/>
+          <a:lstStyle/>
+          <a:p>
+            <a:pPr algn="l">
+              <a:lnSpc>
+                <a:spcPct val="135000"/>
+              </a:lnSpc>
+              <a:spcBef>
+                <a:spcPts val="0"/>
+              </a:spcBef>
+              <a:spcAft>
+                <a:spcPts val="0"/>
+              </a:spcAft>
+            </a:pPr>
+            <a:r>
+              <a:rPr sz="1000" b="0">
                 <a:solidFill>
                   <a:srgbClr val="475569"/>
                 </a:solidFill>
                 <a:latin typeface="Calibri"/>
               </a:rPr>
-              <a:t>Big Four Alumni</a:t>
+              <a:t>Experience three-layer storage with A4 laminate. Voice QR → laminate + NDL deposit + GitHub. Start here.</a:t>
             </a:r>
           </a:p>
         </p:txBody>
@@ -9602,14 +10053,14 @@
         </p:nvSpPr>
         <p:spPr>
           <a:xfrm>
-            <a:off x="2007108" y="2651760"/>
-            <a:ext cx="2674620" cy="347472"/>
+            <a:off x="457200" y="1993392"/>
+            <a:ext cx="7863840" cy="804672"/>
           </a:xfrm>
           <a:prstGeom prst="rect">
             <a:avLst/>
           </a:prstGeom>
           <a:solidFill>
-            <a:srgbClr val="F1F5F9"/>
+            <a:srgbClr val="FFFFFF"/>
           </a:solidFill>
           <a:ln w="9525">
             <a:solidFill>
@@ -9641,14 +10092,57 @@
       </p:sp>
       <p:sp>
         <p:nvSpPr>
-          <p:cNvPr id="11" name="TextBox 10"/>
-          <p:cNvSpPr txBox="1"/>
-          <p:nvPr/>
-        </p:nvSpPr>
-        <p:spPr>
-          <a:xfrm>
-            <a:off x="2098548" y="2651760"/>
-            <a:ext cx="2491740" cy="347472"/>
+          <p:cNvPr id="11" name="Rectangle 10"/>
+          <p:cNvSpPr/>
+          <p:nvPr/>
+        </p:nvSpPr>
+        <p:spPr>
+          <a:xfrm>
+            <a:off x="594360" y="2130552"/>
+            <a:ext cx="457200" cy="457200"/>
+          </a:xfrm>
+          <a:prstGeom prst="rect">
+            <a:avLst/>
+          </a:prstGeom>
+          <a:solidFill>
+            <a:srgbClr val="EFF6FF"/>
+          </a:solidFill>
+          <a:ln>
+            <a:noFill/>
+          </a:ln>
+        </p:spPr>
+        <p:style>
+          <a:lnRef idx="1">
+            <a:schemeClr val="accent1"/>
+          </a:lnRef>
+          <a:fillRef idx="3">
+            <a:schemeClr val="accent1"/>
+          </a:fillRef>
+          <a:effectRef idx="2">
+            <a:schemeClr val="accent1"/>
+          </a:effectRef>
+          <a:fontRef idx="minor">
+            <a:schemeClr val="lt1"/>
+          </a:fontRef>
+        </p:style>
+        <p:txBody>
+          <a:bodyPr rtlCol="0" anchor="ctr"/>
+          <a:lstStyle/>
+          <a:p>
+            <a:pPr algn="ctr"/>
+          </a:p>
+        </p:txBody>
+      </p:sp>
+      <p:sp>
+        <p:nvSpPr>
+          <p:cNvPr id="12" name="TextBox 11"/>
+          <p:cNvSpPr txBox="1"/>
+          <p:nvPr/>
+        </p:nvSpPr>
+        <p:spPr>
+          <a:xfrm>
+            <a:off x="594360" y="2130552"/>
+            <a:ext cx="457200" cy="457200"/>
           </a:xfrm>
           <a:prstGeom prst="rect">
             <a:avLst/>
@@ -9671,33 +10165,119 @@
               </a:spcAft>
             </a:pPr>
             <a:r>
-              <a:rPr sz="800" b="0">
+              <a:rPr sz="1400" b="1">
+                <a:solidFill>
+                  <a:srgbClr val="2563EB"/>
+                </a:solidFill>
+                <a:latin typeface="Calibri"/>
+              </a:rPr>
+              <a:t>Q</a:t>
+            </a:r>
+          </a:p>
+        </p:txBody>
+      </p:sp>
+      <p:sp>
+        <p:nvSpPr>
+          <p:cNvPr id="13" name="TextBox 12"/>
+          <p:cNvSpPr txBox="1"/>
+          <p:nvPr/>
+        </p:nvSpPr>
+        <p:spPr>
+          <a:xfrm>
+            <a:off x="1188720" y="2103120"/>
+            <a:ext cx="6949440" cy="292608"/>
+          </a:xfrm>
+          <a:prstGeom prst="rect">
+            <a:avLst/>
+          </a:prstGeom>
+          <a:noFill/>
+        </p:spPr>
+        <p:txBody>
+          <a:bodyPr wrap="square"/>
+          <a:lstStyle/>
+          <a:p>
+            <a:pPr algn="l">
+              <a:lnSpc>
+                <a:spcPct val="135000"/>
+              </a:lnSpc>
+              <a:spcBef>
+                <a:spcPts val="0"/>
+              </a:spcBef>
+              <a:spcAft>
+                <a:spcPts val="0"/>
+              </a:spcAft>
+            </a:pPr>
+            <a:r>
+              <a:rPr sz="1100" b="1">
+                <a:solidFill>
+                  <a:srgbClr val="1E293B"/>
+                </a:solidFill>
+                <a:latin typeface="Calibri"/>
+              </a:rPr>
+              <a:t>Individual Plan — ¥50,000 ($330)</a:t>
+            </a:r>
+          </a:p>
+        </p:txBody>
+      </p:sp>
+      <p:sp>
+        <p:nvSpPr>
+          <p:cNvPr id="14" name="TextBox 13"/>
+          <p:cNvSpPr txBox="1"/>
+          <p:nvPr/>
+        </p:nvSpPr>
+        <p:spPr>
+          <a:xfrm>
+            <a:off x="1188720" y="2414016"/>
+            <a:ext cx="6949440" cy="274320"/>
+          </a:xfrm>
+          <a:prstGeom prst="rect">
+            <a:avLst/>
+          </a:prstGeom>
+          <a:noFill/>
+        </p:spPr>
+        <p:txBody>
+          <a:bodyPr wrap="square"/>
+          <a:lstStyle/>
+          <a:p>
+            <a:pPr algn="l">
+              <a:lnSpc>
+                <a:spcPct val="135000"/>
+              </a:lnSpc>
+              <a:spcBef>
+                <a:spcPts val="0"/>
+              </a:spcBef>
+              <a:spcAft>
+                <a:spcPts val="0"/>
+              </a:spcAft>
+            </a:pPr>
+            <a:r>
+              <a:rPr sz="1000" b="0">
                 <a:solidFill>
                   <a:srgbClr val="475569"/>
                 </a:solidFill>
                 <a:latin typeface="Calibri"/>
               </a:rPr>
-              <a:t>Semiconductor engineering 20+ yrs</a:t>
-            </a:r>
-          </a:p>
-        </p:txBody>
-      </p:sp>
-      <p:sp>
-        <p:nvSpPr>
-          <p:cNvPr id="12" name="Rectangle 11"/>
+              <a:t>Inscribed on quartz glass. ¥50 per year for proof of existence. 1,000-year durability (theoretical).</a:t>
+            </a:r>
+          </a:p>
+        </p:txBody>
+      </p:sp>
+      <p:sp>
+        <p:nvSpPr>
+          <p:cNvPr id="15" name="Rectangle 14"/>
           <p:cNvSpPr/>
           <p:nvPr/>
         </p:nvSpPr>
         <p:spPr>
           <a:xfrm>
-            <a:off x="4791456" y="2651760"/>
-            <a:ext cx="2880360" cy="347472"/>
+            <a:off x="457200" y="2889504"/>
+            <a:ext cx="7863840" cy="804672"/>
           </a:xfrm>
           <a:prstGeom prst="rect">
             <a:avLst/>
           </a:prstGeom>
           <a:solidFill>
-            <a:srgbClr val="F1F5F9"/>
+            <a:srgbClr val="FFFFFF"/>
           </a:solidFill>
           <a:ln w="9525">
             <a:solidFill>
@@ -9729,14 +10309,57 @@
       </p:sp>
       <p:sp>
         <p:nvSpPr>
-          <p:cNvPr id="13" name="TextBox 12"/>
-          <p:cNvSpPr txBox="1"/>
-          <p:nvPr/>
-        </p:nvSpPr>
-        <p:spPr>
-          <a:xfrm>
-            <a:off x="4882896" y="2651760"/>
-            <a:ext cx="2697480" cy="347472"/>
+          <p:cNvPr id="16" name="Rectangle 15"/>
+          <p:cNvSpPr/>
+          <p:nvPr/>
+        </p:nvSpPr>
+        <p:spPr>
+          <a:xfrm>
+            <a:off x="594360" y="3026664"/>
+            <a:ext cx="457200" cy="457200"/>
+          </a:xfrm>
+          <a:prstGeom prst="rect">
+            <a:avLst/>
+          </a:prstGeom>
+          <a:solidFill>
+            <a:srgbClr val="FDF8E8"/>
+          </a:solidFill>
+          <a:ln>
+            <a:noFill/>
+          </a:ln>
+        </p:spPr>
+        <p:style>
+          <a:lnRef idx="1">
+            <a:schemeClr val="accent1"/>
+          </a:lnRef>
+          <a:fillRef idx="3">
+            <a:schemeClr val="accent1"/>
+          </a:fillRef>
+          <a:effectRef idx="2">
+            <a:schemeClr val="accent1"/>
+          </a:effectRef>
+          <a:fontRef idx="minor">
+            <a:schemeClr val="lt1"/>
+          </a:fontRef>
+        </p:style>
+        <p:txBody>
+          <a:bodyPr rtlCol="0" anchor="ctr"/>
+          <a:lstStyle/>
+          <a:p>
+            <a:pPr algn="ctr"/>
+          </a:p>
+        </p:txBody>
+      </p:sp>
+      <p:sp>
+        <p:nvSpPr>
+          <p:cNvPr id="17" name="TextBox 16"/>
+          <p:cNvSpPr txBox="1"/>
+          <p:nvPr/>
+        </p:nvSpPr>
+        <p:spPr>
+          <a:xfrm>
+            <a:off x="594360" y="3026664"/>
+            <a:ext cx="457200" cy="457200"/>
           </a:xfrm>
           <a:prstGeom prst="rect">
             <a:avLst/>
@@ -9759,33 +10382,119 @@
               </a:spcAft>
             </a:pPr>
             <a:r>
-              <a:rPr sz="800" b="0">
+              <a:rPr sz="1400" b="1">
+                <a:solidFill>
+                  <a:srgbClr val="2563EB"/>
+                </a:solidFill>
+                <a:latin typeface="Calibri"/>
+              </a:rPr>
+              <a:t>F</a:t>
+            </a:r>
+          </a:p>
+        </p:txBody>
+      </p:sp>
+      <p:sp>
+        <p:nvSpPr>
+          <p:cNvPr id="18" name="TextBox 17"/>
+          <p:cNvSpPr txBox="1"/>
+          <p:nvPr/>
+        </p:nvSpPr>
+        <p:spPr>
+          <a:xfrm>
+            <a:off x="1188720" y="2999232"/>
+            <a:ext cx="6949440" cy="292608"/>
+          </a:xfrm>
+          <a:prstGeom prst="rect">
+            <a:avLst/>
+          </a:prstGeom>
+          <a:noFill/>
+        </p:spPr>
+        <p:txBody>
+          <a:bodyPr wrap="square"/>
+          <a:lstStyle/>
+          <a:p>
+            <a:pPr algn="l">
+              <a:lnSpc>
+                <a:spcPct val="135000"/>
+              </a:lnSpc>
+              <a:spcBef>
+                <a:spcPts val="0"/>
+              </a:spcBef>
+              <a:spcAft>
+                <a:spcPts val="0"/>
+              </a:spcAft>
+            </a:pPr>
+            <a:r>
+              <a:rPr sz="1100" b="1">
+                <a:solidFill>
+                  <a:srgbClr val="1E293B"/>
+                </a:solidFill>
+                <a:latin typeface="Calibri"/>
+              </a:rPr>
+              <a:t>Three-Generation — ¥550,000 ($3,600, recommended)</a:t>
+            </a:r>
+          </a:p>
+        </p:txBody>
+      </p:sp>
+      <p:sp>
+        <p:nvSpPr>
+          <p:cNvPr id="19" name="TextBox 18"/>
+          <p:cNvSpPr txBox="1"/>
+          <p:nvPr/>
+        </p:nvSpPr>
+        <p:spPr>
+          <a:xfrm>
+            <a:off x="1188720" y="3310128"/>
+            <a:ext cx="6949440" cy="274320"/>
+          </a:xfrm>
+          <a:prstGeom prst="rect">
+            <a:avLst/>
+          </a:prstGeom>
+          <a:noFill/>
+        </p:spPr>
+        <p:txBody>
+          <a:bodyPr wrap="square"/>
+          <a:lstStyle/>
+          <a:p>
+            <a:pPr algn="l">
+              <a:lnSpc>
+                <a:spcPct val="135000"/>
+              </a:lnSpc>
+              <a:spcBef>
+                <a:spcPts val="0"/>
+              </a:spcBef>
+              <a:spcAft>
+                <a:spcPts val="0"/>
+              </a:spcAft>
+            </a:pPr>
+            <a:r>
+              <a:rPr sz="1000" b="0">
                 <a:solidFill>
                   <a:srgbClr val="475569"/>
                 </a:solidFill>
                 <a:latin typeface="Calibri"/>
               </a:rPr>
-              <a:t>Community president (250 households)</a:t>
-            </a:r>
-          </a:p>
-        </p:txBody>
-      </p:sp>
-      <p:sp>
-        <p:nvSpPr>
-          <p:cNvPr id="14" name="Rectangle 13"/>
+              <a:t>Three family members + on-site inscription on Sado Island. An alternative to traditional graves.</a:t>
+            </a:r>
+          </a:p>
+        </p:txBody>
+      </p:sp>
+      <p:sp>
+        <p:nvSpPr>
+          <p:cNvPr id="20" name="Rectangle 19"/>
           <p:cNvSpPr/>
           <p:nvPr/>
         </p:nvSpPr>
         <p:spPr>
           <a:xfrm>
-            <a:off x="457200" y="3035808"/>
-            <a:ext cx="1714500" cy="347472"/>
+            <a:off x="457200" y="3785616"/>
+            <a:ext cx="7863840" cy="804672"/>
           </a:xfrm>
           <a:prstGeom prst="rect">
             <a:avLst/>
           </a:prstGeom>
           <a:solidFill>
-            <a:srgbClr val="F1F5F9"/>
+            <a:srgbClr val="FFFFFF"/>
           </a:solidFill>
           <a:ln w="9525">
             <a:solidFill>
@@ -9817,68 +10526,23 @@
       </p:sp>
       <p:sp>
         <p:nvSpPr>
-          <p:cNvPr id="15" name="TextBox 14"/>
-          <p:cNvSpPr txBox="1"/>
-          <p:nvPr/>
-        </p:nvSpPr>
-        <p:spPr>
-          <a:xfrm>
-            <a:off x="548640" y="3035808"/>
-            <a:ext cx="1531620" cy="347472"/>
-          </a:xfrm>
-          <a:prstGeom prst="rect">
-            <a:avLst/>
-          </a:prstGeom>
-          <a:noFill/>
-        </p:spPr>
-        <p:txBody>
-          <a:bodyPr wrap="square" anchor="ctr"/>
-          <a:lstStyle/>
-          <a:p>
-            <a:pPr algn="ctr">
-              <a:lnSpc>
-                <a:spcPct val="135000"/>
-              </a:lnSpc>
-              <a:spcBef>
-                <a:spcPts val="0"/>
-              </a:spcBef>
-              <a:spcAft>
-                <a:spcPts val="0"/>
-              </a:spcAft>
-            </a:pPr>
-            <a:r>
-              <a:rPr sz="800" b="0">
-                <a:solidFill>
-                  <a:srgbClr val="475569"/>
-                </a:solidFill>
-                <a:latin typeface="Calibri"/>
-              </a:rPr>
-              <a:t>SoulCarrier founder</a:t>
-            </a:r>
-          </a:p>
-        </p:txBody>
-      </p:sp>
-      <p:sp>
-        <p:nvSpPr>
-          <p:cNvPr id="16" name="Rectangle 15"/>
+          <p:cNvPr id="21" name="Rectangle 20"/>
           <p:cNvSpPr/>
           <p:nvPr/>
         </p:nvSpPr>
         <p:spPr>
           <a:xfrm>
-            <a:off x="2281428" y="3035808"/>
-            <a:ext cx="2057400" cy="347472"/>
+            <a:off x="594360" y="3922776"/>
+            <a:ext cx="457200" cy="457200"/>
           </a:xfrm>
           <a:prstGeom prst="rect">
             <a:avLst/>
           </a:prstGeom>
           <a:solidFill>
-            <a:srgbClr val="F1F5F9"/>
+            <a:srgbClr val="F0FDF4"/>
           </a:solidFill>
-          <a:ln w="9525">
-            <a:solidFill>
-              <a:srgbClr val="E2E8F0"/>
-            </a:solidFill>
+          <a:ln>
+            <a:noFill/>
           </a:ln>
         </p:spPr>
         <p:style>
@@ -9905,14 +10569,14 @@
       </p:sp>
       <p:sp>
         <p:nvSpPr>
-          <p:cNvPr id="17" name="TextBox 16"/>
-          <p:cNvSpPr txBox="1"/>
-          <p:nvPr/>
-        </p:nvSpPr>
-        <p:spPr>
-          <a:xfrm>
-            <a:off x="2372868" y="3035808"/>
-            <a:ext cx="1874520" cy="347472"/>
+          <p:cNvPr id="22" name="TextBox 21"/>
+          <p:cNvSpPr txBox="1"/>
+          <p:nvPr/>
+        </p:nvSpPr>
+        <p:spPr>
+          <a:xfrm>
+            <a:off x="594360" y="3922776"/>
+            <a:ext cx="457200" cy="457200"/>
           </a:xfrm>
           <a:prstGeom prst="rect">
             <a:avLst/>
@@ -9935,318 +10599,99 @@
               </a:spcAft>
             </a:pPr>
             <a:r>
-              <a:rPr sz="800" b="0">
+              <a:rPr sz="1400" b="1">
+                <a:solidFill>
+                  <a:srgbClr val="2563EB"/>
+                </a:solidFill>
+                <a:latin typeface="Calibri"/>
+              </a:rPr>
+              <a:t>V</a:t>
+            </a:r>
+          </a:p>
+        </p:txBody>
+      </p:sp>
+      <p:sp>
+        <p:nvSpPr>
+          <p:cNvPr id="23" name="TextBox 22"/>
+          <p:cNvSpPr txBox="1"/>
+          <p:nvPr/>
+        </p:nvSpPr>
+        <p:spPr>
+          <a:xfrm>
+            <a:off x="1188720" y="3895344"/>
+            <a:ext cx="6949440" cy="292608"/>
+          </a:xfrm>
+          <a:prstGeom prst="rect">
+            <a:avLst/>
+          </a:prstGeom>
+          <a:noFill/>
+        </p:spPr>
+        <p:txBody>
+          <a:bodyPr wrap="square"/>
+          <a:lstStyle/>
+          <a:p>
+            <a:pPr algn="l">
+              <a:lnSpc>
+                <a:spcPct val="135000"/>
+              </a:lnSpc>
+              <a:spcBef>
+                <a:spcPts val="0"/>
+              </a:spcBef>
+              <a:spcAft>
+                <a:spcPts val="0"/>
+              </a:spcAft>
+            </a:pPr>
+            <a:r>
+              <a:rPr sz="1100" b="1">
+                <a:solidFill>
+                  <a:srgbClr val="1E293B"/>
+                </a:solidFill>
+                <a:latin typeface="Calibri"/>
+              </a:rPr>
+              <a:t>Voice Memorial — ¥5,550,000 ($36,500)</a:t>
+            </a:r>
+          </a:p>
+        </p:txBody>
+      </p:sp>
+      <p:sp>
+        <p:nvSpPr>
+          <p:cNvPr id="24" name="TextBox 23"/>
+          <p:cNvSpPr txBox="1"/>
+          <p:nvPr/>
+        </p:nvSpPr>
+        <p:spPr>
+          <a:xfrm>
+            <a:off x="1188720" y="4206240"/>
+            <a:ext cx="6949440" cy="274320"/>
+          </a:xfrm>
+          <a:prstGeom prst="rect">
+            <a:avLst/>
+          </a:prstGeom>
+          <a:noFill/>
+        </p:spPr>
+        <p:txBody>
+          <a:bodyPr wrap="square"/>
+          <a:lstStyle/>
+          <a:p>
+            <a:pPr algn="l">
+              <a:lnSpc>
+                <a:spcPct val="135000"/>
+              </a:lnSpc>
+              <a:spcBef>
+                <a:spcPts val="0"/>
+              </a:spcBef>
+              <a:spcAft>
+                <a:spcPts val="0"/>
+              </a:spcAft>
+            </a:pPr>
+            <a:r>
+              <a:rPr sz="1000" b="0">
                 <a:solidFill>
                   <a:srgbClr val="475569"/>
                 </a:solidFill>
                 <a:latin typeface="Calibri"/>
               </a:rPr>
-              <a:t>70+ philosophical essays</a:t>
-            </a:r>
-          </a:p>
-        </p:txBody>
-      </p:sp>
-      <p:sp>
-        <p:nvSpPr>
-          <p:cNvPr id="18" name="Rectangle 17"/>
-          <p:cNvSpPr/>
-          <p:nvPr/>
-        </p:nvSpPr>
-        <p:spPr>
-          <a:xfrm>
-            <a:off x="4448556" y="3035808"/>
-            <a:ext cx="1645919" cy="347472"/>
-          </a:xfrm>
-          <a:prstGeom prst="rect">
-            <a:avLst/>
-          </a:prstGeom>
-          <a:solidFill>
-            <a:srgbClr val="F1F5F9"/>
-          </a:solidFill>
-          <a:ln w="9525">
-            <a:solidFill>
-              <a:srgbClr val="E2E8F0"/>
-            </a:solidFill>
-          </a:ln>
-        </p:spPr>
-        <p:style>
-          <a:lnRef idx="1">
-            <a:schemeClr val="accent1"/>
-          </a:lnRef>
-          <a:fillRef idx="3">
-            <a:schemeClr val="accent1"/>
-          </a:fillRef>
-          <a:effectRef idx="2">
-            <a:schemeClr val="accent1"/>
-          </a:effectRef>
-          <a:fontRef idx="minor">
-            <a:schemeClr val="lt1"/>
-          </a:fontRef>
-        </p:style>
-        <p:txBody>
-          <a:bodyPr rtlCol="0" anchor="ctr"/>
-          <a:lstStyle/>
-          <a:p>
-            <a:pPr algn="ctr"/>
-          </a:p>
-        </p:txBody>
-      </p:sp>
-      <p:sp>
-        <p:nvSpPr>
-          <p:cNvPr id="19" name="TextBox 18"/>
-          <p:cNvSpPr txBox="1"/>
-          <p:nvPr/>
-        </p:nvSpPr>
-        <p:spPr>
-          <a:xfrm>
-            <a:off x="4539996" y="3035808"/>
-            <a:ext cx="1463039" cy="347472"/>
-          </a:xfrm>
-          <a:prstGeom prst="rect">
-            <a:avLst/>
-          </a:prstGeom>
-          <a:noFill/>
-        </p:spPr>
-        <p:txBody>
-          <a:bodyPr wrap="square" anchor="ctr"/>
-          <a:lstStyle/>
-          <a:p>
-            <a:pPr algn="ctr">
-              <a:lnSpc>
-                <a:spcPct val="135000"/>
-              </a:lnSpc>
-              <a:spcBef>
-                <a:spcPts val="0"/>
-              </a:spcBef>
-              <a:spcAft>
-                <a:spcPts val="0"/>
-              </a:spcAft>
-            </a:pPr>
-            <a:r>
-              <a:rPr sz="800" b="0">
-                <a:solidFill>
-                  <a:srgbClr val="475569"/>
-                </a:solidFill>
-                <a:latin typeface="Calibri"/>
-              </a:rPr>
-              <a:t>Off-grid validated</a:t>
-            </a:r>
-          </a:p>
-        </p:txBody>
-      </p:sp>
-      <p:sp>
-        <p:nvSpPr>
-          <p:cNvPr id="20" name="Rectangle 19"/>
-          <p:cNvSpPr/>
-          <p:nvPr/>
-        </p:nvSpPr>
-        <p:spPr>
-          <a:xfrm>
-            <a:off x="457200" y="3419856"/>
-            <a:ext cx="3086100" cy="347472"/>
-          </a:xfrm>
-          <a:prstGeom prst="rect">
-            <a:avLst/>
-          </a:prstGeom>
-          <a:solidFill>
-            <a:srgbClr val="F1F5F9"/>
-          </a:solidFill>
-          <a:ln w="9525">
-            <a:solidFill>
-              <a:srgbClr val="E2E8F0"/>
-            </a:solidFill>
-          </a:ln>
-        </p:spPr>
-        <p:style>
-          <a:lnRef idx="1">
-            <a:schemeClr val="accent1"/>
-          </a:lnRef>
-          <a:fillRef idx="3">
-            <a:schemeClr val="accent1"/>
-          </a:fillRef>
-          <a:effectRef idx="2">
-            <a:schemeClr val="accent1"/>
-          </a:effectRef>
-          <a:fontRef idx="minor">
-            <a:schemeClr val="lt1"/>
-          </a:fontRef>
-        </p:style>
-        <p:txBody>
-          <a:bodyPr rtlCol="0" anchor="ctr"/>
-          <a:lstStyle/>
-          <a:p>
-            <a:pPr algn="ctr"/>
-          </a:p>
-        </p:txBody>
-      </p:sp>
-      <p:sp>
-        <p:nvSpPr>
-          <p:cNvPr id="21" name="TextBox 20"/>
-          <p:cNvSpPr txBox="1"/>
-          <p:nvPr/>
-        </p:nvSpPr>
-        <p:spPr>
-          <a:xfrm>
-            <a:off x="548640" y="3419856"/>
-            <a:ext cx="2903220" cy="347472"/>
-          </a:xfrm>
-          <a:prstGeom prst="rect">
-            <a:avLst/>
-          </a:prstGeom>
-          <a:noFill/>
-        </p:spPr>
-        <p:txBody>
-          <a:bodyPr wrap="square" anchor="ctr"/>
-          <a:lstStyle/>
-          <a:p>
-            <a:pPr algn="ctr">
-              <a:lnSpc>
-                <a:spcPct val="135000"/>
-              </a:lnSpc>
-              <a:spcBef>
-                <a:spcPts val="0"/>
-              </a:spcBef>
-              <a:spcAft>
-                <a:spcPts val="0"/>
-              </a:spcAft>
-            </a:pPr>
-            <a:r>
-              <a:rPr sz="800" b="0">
-                <a:solidFill>
-                  <a:srgbClr val="475569"/>
-                </a:solidFill>
-                <a:latin typeface="Calibri"/>
-              </a:rPr>
-              <a:t>Relocating to Sado Island (Spring 2026)</a:t>
-            </a:r>
-          </a:p>
-        </p:txBody>
-      </p:sp>
-      <p:sp>
-        <p:nvSpPr>
-          <p:cNvPr id="22" name="Rectangle 21"/>
-          <p:cNvSpPr/>
-          <p:nvPr/>
-        </p:nvSpPr>
-        <p:spPr>
-          <a:xfrm>
-            <a:off x="457200" y="3931920"/>
-            <a:ext cx="7863840" cy="772668"/>
-          </a:xfrm>
-          <a:prstGeom prst="rect">
-            <a:avLst/>
-          </a:prstGeom>
-          <a:solidFill>
-            <a:srgbClr val="EFF6FF"/>
-          </a:solidFill>
-          <a:ln>
-            <a:noFill/>
-          </a:ln>
-        </p:spPr>
-        <p:style>
-          <a:lnRef idx="1">
-            <a:schemeClr val="accent1"/>
-          </a:lnRef>
-          <a:fillRef idx="3">
-            <a:schemeClr val="accent1"/>
-          </a:fillRef>
-          <a:effectRef idx="2">
-            <a:schemeClr val="accent1"/>
-          </a:effectRef>
-          <a:fontRef idx="minor">
-            <a:schemeClr val="lt1"/>
-          </a:fontRef>
-        </p:style>
-        <p:txBody>
-          <a:bodyPr rtlCol="0" anchor="ctr"/>
-          <a:lstStyle/>
-          <a:p>
-            <a:pPr algn="ctr"/>
-          </a:p>
-        </p:txBody>
-      </p:sp>
-      <p:sp>
-        <p:nvSpPr>
-          <p:cNvPr id="23" name="Rectangle 22"/>
-          <p:cNvSpPr/>
-          <p:nvPr/>
-        </p:nvSpPr>
-        <p:spPr>
-          <a:xfrm>
-            <a:off x="457200" y="3931920"/>
-            <a:ext cx="54864" cy="772668"/>
-          </a:xfrm>
-          <a:prstGeom prst="rect">
-            <a:avLst/>
-          </a:prstGeom>
-          <a:solidFill>
-            <a:srgbClr val="C9A962"/>
-          </a:solidFill>
-          <a:ln>
-            <a:noFill/>
-          </a:ln>
-        </p:spPr>
-        <p:style>
-          <a:lnRef idx="1">
-            <a:schemeClr val="accent1"/>
-          </a:lnRef>
-          <a:fillRef idx="3">
-            <a:schemeClr val="accent1"/>
-          </a:fillRef>
-          <a:effectRef idx="2">
-            <a:schemeClr val="accent1"/>
-          </a:effectRef>
-          <a:fontRef idx="minor">
-            <a:schemeClr val="lt1"/>
-          </a:fontRef>
-        </p:style>
-        <p:txBody>
-          <a:bodyPr rtlCol="0" anchor="ctr"/>
-          <a:lstStyle/>
-          <a:p>
-            <a:pPr algn="ctr"/>
-          </a:p>
-        </p:txBody>
-      </p:sp>
-      <p:sp>
-        <p:nvSpPr>
-          <p:cNvPr id="24" name="TextBox 23"/>
-          <p:cNvSpPr txBox="1"/>
-          <p:nvPr/>
-        </p:nvSpPr>
-        <p:spPr>
-          <a:xfrm>
-            <a:off x="685800" y="4005072"/>
-            <a:ext cx="7543800" cy="626364"/>
-          </a:xfrm>
-          <a:prstGeom prst="rect">
-            <a:avLst/>
-          </a:prstGeom>
-          <a:noFill/>
-        </p:spPr>
-        <p:txBody>
-          <a:bodyPr wrap="square"/>
-          <a:lstStyle/>
-          <a:p>
-            <a:pPr algn="l">
-              <a:lnSpc>
-                <a:spcPct val="135000"/>
-              </a:lnSpc>
-              <a:spcBef>
-                <a:spcPts val="0"/>
-              </a:spcBef>
-              <a:spcAft>
-                <a:spcPts val="0"/>
-              </a:spcAft>
-            </a:pPr>
-            <a:r>
-              <a:rPr sz="900" b="0">
-                <a:solidFill>
-                  <a:srgbClr val="1E293B"/>
-                </a:solidFill>
-                <a:latin typeface="Calibri"/>
-              </a:rPr>
-              <a:t>I visited Pearl Harbor with my family, carrying a plate inscribed with a voice QR code of our prayers for peace—alongside the remains of our beloved dog, Pearl. That's when it hit me: wishes that transcend time transform into something greater—love, peace, hope. I want to share that transformation with as many people as possible. Through TokiStorage, I hope to walk that journey across time together with you.</a:t>
+              <a:t>Fully bespoke. Voice restoration, custom design, and the complete premium experience.</a:t>
             </a:r>
           </a:p>
         </p:txBody>
@@ -10450,7 +10895,7 @@
         <p:spPr>
           <a:xfrm>
             <a:off x="0" y="0"/>
-            <a:ext cx="9144000" cy="5143500"/>
+            <a:ext cx="9144000" cy="594360"/>
           </a:xfrm>
           <a:prstGeom prst="rect">
             <a:avLst/>
@@ -10492,8 +10937,51 @@
         </p:nvSpPr>
         <p:spPr>
           <a:xfrm>
-            <a:off x="457200" y="137160"/>
-            <a:ext cx="3657600" cy="411480"/>
+            <a:off x="457200" y="0"/>
+            <a:ext cx="8229600" cy="594360"/>
+          </a:xfrm>
+          <a:prstGeom prst="rect">
+            <a:avLst/>
+          </a:prstGeom>
+          <a:noFill/>
+        </p:spPr>
+        <p:txBody>
+          <a:bodyPr wrap="square" anchor="ctr"/>
+          <a:lstStyle/>
+          <a:p>
+            <a:pPr algn="l">
+              <a:lnSpc>
+                <a:spcPct val="135000"/>
+              </a:lnSpc>
+              <a:spcBef>
+                <a:spcPts val="0"/>
+              </a:spcBef>
+              <a:spcAft>
+                <a:spcPts val="0"/>
+              </a:spcAft>
+            </a:pPr>
+            <a:r>
+              <a:rPr sz="1200" b="1">
+                <a:solidFill>
+                  <a:srgbClr val="FFFFFF"/>
+                </a:solidFill>
+                <a:latin typeface="Calibri"/>
+              </a:rPr>
+              <a:t>The person who engages your story with a millennium perspective — your dialogue partner</a:t>
+            </a:r>
+          </a:p>
+        </p:txBody>
+      </p:sp>
+      <p:sp>
+        <p:nvSpPr>
+          <p:cNvPr id="4" name="TextBox 3"/>
+          <p:cNvSpPr txBox="1"/>
+          <p:nvPr/>
+        </p:nvSpPr>
+        <p:spPr>
+          <a:xfrm>
+            <a:off x="457200" y="731520"/>
+            <a:ext cx="2743200" cy="274320"/>
           </a:xfrm>
           <a:prstGeom prst="rect">
             <a:avLst/>
@@ -10516,27 +11004,94 @@
               </a:spcAft>
             </a:pPr>
             <a:r>
+              <a:rPr sz="1000" b="1">
+                <a:solidFill>
+                  <a:srgbClr val="2563EB"/>
+                </a:solidFill>
+                <a:latin typeface="Calibri"/>
+              </a:rPr>
+              <a:t>YOUR PARTNER</a:t>
+            </a:r>
+          </a:p>
+        </p:txBody>
+      </p:sp>
+      <p:pic>
+        <p:nvPicPr>
+          <p:cNvPr id="5" name="Picture 4" descr="_client_deck_profile.png"/>
+          <p:cNvPicPr>
+            <a:picLocks noChangeAspect="1"/>
+          </p:cNvPicPr>
+          <p:nvPr/>
+        </p:nvPicPr>
+        <p:blipFill>
+          <a:blip r:embed="rId2"/>
+          <a:stretch>
+            <a:fillRect/>
+          </a:stretch>
+        </p:blipFill>
+        <p:spPr>
+          <a:xfrm>
+            <a:off x="457200" y="1024128"/>
+            <a:ext cx="914400" cy="914400"/>
+          </a:xfrm>
+          <a:prstGeom prst="rect">
+            <a:avLst/>
+          </a:prstGeom>
+        </p:spPr>
+      </p:pic>
+      <p:sp>
+        <p:nvSpPr>
+          <p:cNvPr id="6" name="TextBox 5"/>
+          <p:cNvSpPr txBox="1"/>
+          <p:nvPr/>
+        </p:nvSpPr>
+        <p:spPr>
+          <a:xfrm>
+            <a:off x="1508760" y="1078992"/>
+            <a:ext cx="6675120" cy="320040"/>
+          </a:xfrm>
+          <a:prstGeom prst="rect">
+            <a:avLst/>
+          </a:prstGeom>
+          <a:noFill/>
+        </p:spPr>
+        <p:txBody>
+          <a:bodyPr wrap="square"/>
+          <a:lstStyle/>
+          <a:p>
+            <a:pPr algn="l">
+              <a:lnSpc>
+                <a:spcPct val="135000"/>
+              </a:lnSpc>
+              <a:spcBef>
+                <a:spcPts val="0"/>
+              </a:spcBef>
+              <a:spcAft>
+                <a:spcPts val="0"/>
+              </a:spcAft>
+            </a:pPr>
+            <a:r>
               <a:rPr sz="1300" b="1">
                 <a:solidFill>
-                  <a:srgbClr val="FFFFFF"/>
-                </a:solidFill>
-                <a:latin typeface="Calibri"/>
-              </a:rPr>
-              <a:t>Next Step</a:t>
-            </a:r>
-          </a:p>
-        </p:txBody>
-      </p:sp>
-      <p:sp>
-        <p:nvSpPr>
-          <p:cNvPr id="4" name="TextBox 3"/>
-          <p:cNvSpPr txBox="1"/>
-          <p:nvPr/>
-        </p:nvSpPr>
-        <p:spPr>
-          <a:xfrm>
-            <a:off x="457200" y="777240"/>
-            <a:ext cx="7315200" cy="457200"/>
+                  <a:srgbClr val="1E293B"/>
+                </a:solidFill>
+                <a:latin typeface="Calibri"/>
+              </a:rPr>
+              <a:t>Takuya Sato — Founder, TokiStorage</a:t>
+            </a:r>
+          </a:p>
+        </p:txBody>
+      </p:sp>
+      <p:sp>
+        <p:nvSpPr>
+          <p:cNvPr id="7" name="TextBox 6"/>
+          <p:cNvSpPr txBox="1"/>
+          <p:nvPr/>
+        </p:nvSpPr>
+        <p:spPr>
+          <a:xfrm>
+            <a:off x="1508760" y="1444752"/>
+            <a:ext cx="6675120" cy="1097280"/>
           </a:xfrm>
           <a:prstGeom prst="rect">
             <a:avLst/>
@@ -10559,36 +11114,38 @@
               </a:spcAft>
             </a:pPr>
             <a:r>
-              <a:rPr sz="2000" b="1">
-                <a:solidFill>
-                  <a:srgbClr val="FFFFFF"/>
-                </a:solidFill>
-                <a:latin typeface="Calibri"/>
-              </a:rPr>
-              <a:t>Let's start with a conversation.</a:t>
-            </a:r>
-          </a:p>
-        </p:txBody>
-      </p:sp>
-      <p:sp>
-        <p:nvSpPr>
-          <p:cNvPr id="5" name="Oval 4"/>
+              <a:rPr sz="900" b="0">
+                <a:solidFill>
+                  <a:srgbClr val="475569"/>
+                </a:solidFill>
+                <a:latin typeface="Calibri"/>
+              </a:rPr>
+              <a:t>Former Big Four consultant — understands executive dialogue and strategic thinking from the inside. 20+ years in semiconductor manufacturing engineering. Former president of Timeless Town Shin-Urayasu residents' association (250 households). Through SoulCarrier's work with unclaimed graves, witnessed firsthand how memories vanish — and conceived TokiStorage. Validated off-grid, institution-free 1,000-year design through testing in Maui and Lake Yamanakako. Author of 70+ philosophical essays exploring proof of existence across 9 intellectual domains.</a:t>
+            </a:r>
+          </a:p>
+        </p:txBody>
+      </p:sp>
+      <p:sp>
+        <p:nvSpPr>
+          <p:cNvPr id="8" name="Rectangle 7"/>
           <p:cNvSpPr/>
           <p:nvPr/>
         </p:nvSpPr>
         <p:spPr>
           <a:xfrm>
-            <a:off x="731520" y="1572768"/>
-            <a:ext cx="384048" cy="384048"/>
-          </a:xfrm>
-          <a:prstGeom prst="ellipse">
+            <a:off x="457200" y="2651760"/>
+            <a:ext cx="1440180" cy="347472"/>
+          </a:xfrm>
+          <a:prstGeom prst="rect">
             <a:avLst/>
           </a:prstGeom>
           <a:solidFill>
-            <a:srgbClr val="2563EB"/>
+            <a:srgbClr val="F1F5F9"/>
           </a:solidFill>
-          <a:ln>
-            <a:noFill/>
+          <a:ln w="9525">
+            <a:solidFill>
+              <a:srgbClr val="E2E8F0"/>
+            </a:solidFill>
           </a:ln>
         </p:spPr>
         <p:style>
@@ -10615,14 +11172,14 @@
       </p:sp>
       <p:sp>
         <p:nvSpPr>
-          <p:cNvPr id="6" name="TextBox 5"/>
-          <p:cNvSpPr txBox="1"/>
-          <p:nvPr/>
-        </p:nvSpPr>
-        <p:spPr>
-          <a:xfrm>
-            <a:off x="731520" y="1572768"/>
-            <a:ext cx="384048" cy="384048"/>
+          <p:cNvPr id="9" name="TextBox 8"/>
+          <p:cNvSpPr txBox="1"/>
+          <p:nvPr/>
+        </p:nvSpPr>
+        <p:spPr>
+          <a:xfrm>
+            <a:off x="548640" y="2651760"/>
+            <a:ext cx="1257300" cy="347472"/>
           </a:xfrm>
           <a:prstGeom prst="rect">
             <a:avLst/>
@@ -10645,122 +11202,38 @@
               </a:spcAft>
             </a:pPr>
             <a:r>
-              <a:rPr sz="1000" b="1">
-                <a:solidFill>
-                  <a:srgbClr val="FFFFFF"/>
-                </a:solidFill>
-                <a:latin typeface="Calibri"/>
-              </a:rPr>
-              <a:t>01</a:t>
-            </a:r>
-          </a:p>
-        </p:txBody>
-      </p:sp>
-      <p:sp>
-        <p:nvSpPr>
-          <p:cNvPr id="7" name="TextBox 6"/>
-          <p:cNvSpPr txBox="1"/>
-          <p:nvPr/>
-        </p:nvSpPr>
-        <p:spPr>
-          <a:xfrm>
-            <a:off x="1280160" y="1517904"/>
-            <a:ext cx="6400800" cy="274320"/>
-          </a:xfrm>
-          <a:prstGeom prst="rect">
-            <a:avLst/>
-          </a:prstGeom>
-          <a:noFill/>
-        </p:spPr>
-        <p:txBody>
-          <a:bodyPr wrap="square"/>
-          <a:lstStyle/>
-          <a:p>
-            <a:pPr algn="l">
-              <a:lnSpc>
-                <a:spcPct val="135000"/>
-              </a:lnSpc>
-              <a:spcBef>
-                <a:spcPts val="0"/>
-              </a:spcBef>
-              <a:spcAft>
-                <a:spcPts val="0"/>
-              </a:spcAft>
-            </a:pPr>
-            <a:r>
-              <a:rPr sz="1200" b="1">
-                <a:solidFill>
-                  <a:srgbClr val="FFFFFF"/>
-                </a:solidFill>
-                <a:latin typeface="Calibri"/>
-              </a:rPr>
-              <a:t>Initial Dialogue (90 min, complimentary)</a:t>
-            </a:r>
-          </a:p>
-        </p:txBody>
-      </p:sp>
-      <p:sp>
-        <p:nvSpPr>
-          <p:cNvPr id="8" name="TextBox 7"/>
-          <p:cNvSpPr txBox="1"/>
-          <p:nvPr/>
-        </p:nvSpPr>
-        <p:spPr>
-          <a:xfrm>
-            <a:off x="1280160" y="1810512"/>
-            <a:ext cx="6400800" cy="274320"/>
-          </a:xfrm>
-          <a:prstGeom prst="rect">
-            <a:avLst/>
-          </a:prstGeom>
-          <a:noFill/>
-        </p:spPr>
-        <p:txBody>
-          <a:bodyPr wrap="square"/>
-          <a:lstStyle/>
-          <a:p>
-            <a:pPr algn="l">
-              <a:lnSpc>
-                <a:spcPct val="135000"/>
-              </a:lnSpc>
-              <a:spcBef>
-                <a:spcPts val="0"/>
-              </a:spcBef>
-              <a:spcAft>
-                <a:spcPts val="0"/>
-              </a:spcAft>
-            </a:pPr>
-            <a:r>
-              <a:rPr sz="1000" b="0">
-                <a:solidFill>
-                  <a:srgbClr val="BBBBCC"/>
-                </a:solidFill>
-                <a:latin typeface="Calibri"/>
-              </a:rPr>
-              <a:t>Explore "What will you preserve for 100 years?" together</a:t>
-            </a:r>
-          </a:p>
-        </p:txBody>
-      </p:sp>
-      <p:sp>
-        <p:nvSpPr>
-          <p:cNvPr id="9" name="Oval 8"/>
+              <a:rPr sz="800" b="0">
+                <a:solidFill>
+                  <a:srgbClr val="475569"/>
+                </a:solidFill>
+                <a:latin typeface="Calibri"/>
+              </a:rPr>
+              <a:t>Big Four Alumni</a:t>
+            </a:r>
+          </a:p>
+        </p:txBody>
+      </p:sp>
+      <p:sp>
+        <p:nvSpPr>
+          <p:cNvPr id="10" name="Rectangle 9"/>
           <p:cNvSpPr/>
           <p:nvPr/>
         </p:nvSpPr>
         <p:spPr>
           <a:xfrm>
-            <a:off x="731520" y="2286000"/>
-            <a:ext cx="384048" cy="384048"/>
-          </a:xfrm>
-          <a:prstGeom prst="ellipse">
+            <a:off x="2007108" y="2651760"/>
+            <a:ext cx="2674620" cy="347472"/>
+          </a:xfrm>
+          <a:prstGeom prst="rect">
             <a:avLst/>
           </a:prstGeom>
           <a:solidFill>
-            <a:srgbClr val="2563EB"/>
+            <a:srgbClr val="F1F5F9"/>
           </a:solidFill>
-          <a:ln>
-            <a:noFill/>
+          <a:ln w="9525">
+            <a:solidFill>
+              <a:srgbClr val="E2E8F0"/>
+            </a:solidFill>
           </a:ln>
         </p:spPr>
         <p:style>
@@ -10787,14 +11260,14 @@
       </p:sp>
       <p:sp>
         <p:nvSpPr>
-          <p:cNvPr id="10" name="TextBox 9"/>
-          <p:cNvSpPr txBox="1"/>
-          <p:nvPr/>
-        </p:nvSpPr>
-        <p:spPr>
-          <a:xfrm>
-            <a:off x="731520" y="2286000"/>
-            <a:ext cx="384048" cy="384048"/>
+          <p:cNvPr id="11" name="TextBox 10"/>
+          <p:cNvSpPr txBox="1"/>
+          <p:nvPr/>
+        </p:nvSpPr>
+        <p:spPr>
+          <a:xfrm>
+            <a:off x="2098548" y="2651760"/>
+            <a:ext cx="2491740" cy="347472"/>
           </a:xfrm>
           <a:prstGeom prst="rect">
             <a:avLst/>
@@ -10817,122 +11290,38 @@
               </a:spcAft>
             </a:pPr>
             <a:r>
-              <a:rPr sz="1000" b="1">
-                <a:solidFill>
-                  <a:srgbClr val="FFFFFF"/>
-                </a:solidFill>
-                <a:latin typeface="Calibri"/>
-              </a:rPr>
-              <a:t>02</a:t>
-            </a:r>
-          </a:p>
-        </p:txBody>
-      </p:sp>
-      <p:sp>
-        <p:nvSpPr>
-          <p:cNvPr id="11" name="TextBox 10"/>
-          <p:cNvSpPr txBox="1"/>
-          <p:nvPr/>
-        </p:nvSpPr>
-        <p:spPr>
-          <a:xfrm>
-            <a:off x="1280160" y="2231136"/>
-            <a:ext cx="6400800" cy="274320"/>
-          </a:xfrm>
-          <a:prstGeom prst="rect">
-            <a:avLst/>
-          </a:prstGeom>
-          <a:noFill/>
-        </p:spPr>
-        <p:txBody>
-          <a:bodyPr wrap="square"/>
-          <a:lstStyle/>
-          <a:p>
-            <a:pPr algn="l">
-              <a:lnSpc>
-                <a:spcPct val="135000"/>
-              </a:lnSpc>
-              <a:spcBef>
-                <a:spcPts val="0"/>
-              </a:spcBef>
-              <a:spcAft>
-                <a:spcPts val="0"/>
-              </a:spcAft>
-            </a:pPr>
-            <a:r>
-              <a:rPr sz="1200" b="1">
-                <a:solidFill>
-                  <a:srgbClr val="FFFFFF"/>
-                </a:solidFill>
-                <a:latin typeface="Calibri"/>
-              </a:rPr>
-              <a:t>Design Proposal</a:t>
-            </a:r>
-          </a:p>
-        </p:txBody>
-      </p:sp>
-      <p:sp>
-        <p:nvSpPr>
-          <p:cNvPr id="12" name="TextBox 11"/>
-          <p:cNvSpPr txBox="1"/>
-          <p:nvPr/>
-        </p:nvSpPr>
-        <p:spPr>
-          <a:xfrm>
-            <a:off x="1280160" y="2523744"/>
-            <a:ext cx="6400800" cy="274320"/>
-          </a:xfrm>
-          <a:prstGeom prst="rect">
-            <a:avLst/>
-          </a:prstGeom>
-          <a:noFill/>
-        </p:spPr>
-        <p:txBody>
-          <a:bodyPr wrap="square"/>
-          <a:lstStyle/>
-          <a:p>
-            <a:pPr algn="l">
-              <a:lnSpc>
-                <a:spcPct val="135000"/>
-              </a:lnSpc>
-              <a:spcBef>
-                <a:spcPts val="0"/>
-              </a:spcBef>
-              <a:spcAft>
-                <a:spcPts val="0"/>
-              </a:spcAft>
-            </a:pPr>
-            <a:r>
-              <a:rPr sz="1000" b="0">
-                <a:solidFill>
-                  <a:srgbClr val="BBBBCC"/>
-                </a:solidFill>
-                <a:latin typeface="Calibri"/>
-              </a:rPr>
-              <a:t>A personalized proof of existence plan based on our dialogue</a:t>
-            </a:r>
-          </a:p>
-        </p:txBody>
-      </p:sp>
-      <p:sp>
-        <p:nvSpPr>
-          <p:cNvPr id="13" name="Oval 12"/>
+              <a:rPr sz="800" b="0">
+                <a:solidFill>
+                  <a:srgbClr val="475569"/>
+                </a:solidFill>
+                <a:latin typeface="Calibri"/>
+              </a:rPr>
+              <a:t>Semiconductor engineering 20+ yrs</a:t>
+            </a:r>
+          </a:p>
+        </p:txBody>
+      </p:sp>
+      <p:sp>
+        <p:nvSpPr>
+          <p:cNvPr id="12" name="Rectangle 11"/>
           <p:cNvSpPr/>
           <p:nvPr/>
         </p:nvSpPr>
         <p:spPr>
           <a:xfrm>
-            <a:off x="731520" y="2999232"/>
-            <a:ext cx="384048" cy="384048"/>
-          </a:xfrm>
-          <a:prstGeom prst="ellipse">
+            <a:off x="4791456" y="2651760"/>
+            <a:ext cx="2880360" cy="347472"/>
+          </a:xfrm>
+          <a:prstGeom prst="rect">
             <a:avLst/>
           </a:prstGeom>
           <a:solidFill>
-            <a:srgbClr val="2563EB"/>
+            <a:srgbClr val="F1F5F9"/>
           </a:solidFill>
-          <a:ln>
-            <a:noFill/>
+          <a:ln w="9525">
+            <a:solidFill>
+              <a:srgbClr val="E2E8F0"/>
+            </a:solidFill>
           </a:ln>
         </p:spPr>
         <p:style>
@@ -10959,14 +11348,14 @@
       </p:sp>
       <p:sp>
         <p:nvSpPr>
-          <p:cNvPr id="14" name="TextBox 13"/>
-          <p:cNvSpPr txBox="1"/>
-          <p:nvPr/>
-        </p:nvSpPr>
-        <p:spPr>
-          <a:xfrm>
-            <a:off x="731520" y="2999232"/>
-            <a:ext cx="384048" cy="384048"/>
+          <p:cNvPr id="13" name="TextBox 12"/>
+          <p:cNvSpPr txBox="1"/>
+          <p:nvPr/>
+        </p:nvSpPr>
+        <p:spPr>
+          <a:xfrm>
+            <a:off x="4882896" y="2651760"/>
+            <a:ext cx="2697480" cy="347472"/>
           </a:xfrm>
           <a:prstGeom prst="rect">
             <a:avLst/>
@@ -10989,122 +11378,38 @@
               </a:spcAft>
             </a:pPr>
             <a:r>
-              <a:rPr sz="1000" b="1">
-                <a:solidFill>
-                  <a:srgbClr val="FFFFFF"/>
-                </a:solidFill>
-                <a:latin typeface="Calibri"/>
-              </a:rPr>
-              <a:t>03</a:t>
-            </a:r>
-          </a:p>
-        </p:txBody>
-      </p:sp>
-      <p:sp>
-        <p:nvSpPr>
-          <p:cNvPr id="15" name="TextBox 14"/>
-          <p:cNvSpPr txBox="1"/>
-          <p:nvPr/>
-        </p:nvSpPr>
-        <p:spPr>
-          <a:xfrm>
-            <a:off x="1280160" y="2944368"/>
-            <a:ext cx="6400800" cy="274320"/>
-          </a:xfrm>
-          <a:prstGeom prst="rect">
-            <a:avLst/>
-          </a:prstGeom>
-          <a:noFill/>
-        </p:spPr>
-        <p:txBody>
-          <a:bodyPr wrap="square"/>
-          <a:lstStyle/>
-          <a:p>
-            <a:pPr algn="l">
-              <a:lnSpc>
-                <a:spcPct val="135000"/>
-              </a:lnSpc>
-              <a:spcBef>
-                <a:spcPts val="0"/>
-              </a:spcBef>
-              <a:spcAft>
-                <a:spcPts val="0"/>
-              </a:spcAft>
-            </a:pPr>
-            <a:r>
-              <a:rPr sz="1200" b="1">
-                <a:solidFill>
-                  <a:srgbClr val="FFFFFF"/>
-                </a:solidFill>
-                <a:latin typeface="Calibri"/>
-              </a:rPr>
-              <a:t>Creation &amp; Inscription</a:t>
-            </a:r>
-          </a:p>
-        </p:txBody>
-      </p:sp>
-      <p:sp>
-        <p:nvSpPr>
-          <p:cNvPr id="16" name="TextBox 15"/>
-          <p:cNvSpPr txBox="1"/>
-          <p:nvPr/>
-        </p:nvSpPr>
-        <p:spPr>
-          <a:xfrm>
-            <a:off x="1280160" y="3236976"/>
-            <a:ext cx="6400800" cy="274320"/>
-          </a:xfrm>
-          <a:prstGeom prst="rect">
-            <a:avLst/>
-          </a:prstGeom>
-          <a:noFill/>
-        </p:spPr>
-        <p:txBody>
-          <a:bodyPr wrap="square"/>
-          <a:lstStyle/>
-          <a:p>
-            <a:pPr algn="l">
-              <a:lnSpc>
-                <a:spcPct val="135000"/>
-              </a:lnSpc>
-              <a:spcBef>
-                <a:spcPts val="0"/>
-              </a:spcBef>
-              <a:spcAft>
-                <a:spcPts val="0"/>
-              </a:spcAft>
-            </a:pPr>
-            <a:r>
-              <a:rPr sz="1000" b="0">
-                <a:solidFill>
-                  <a:srgbClr val="BBBBCC"/>
-                </a:solidFill>
-                <a:latin typeface="Calibri"/>
-              </a:rPr>
-              <a:t>Produce and permanently inscribe in quartz glass</a:t>
-            </a:r>
-          </a:p>
-        </p:txBody>
-      </p:sp>
-      <p:sp>
-        <p:nvSpPr>
-          <p:cNvPr id="17" name="Oval 16"/>
+              <a:rPr sz="800" b="0">
+                <a:solidFill>
+                  <a:srgbClr val="475569"/>
+                </a:solidFill>
+                <a:latin typeface="Calibri"/>
+              </a:rPr>
+              <a:t>Community president (250 households)</a:t>
+            </a:r>
+          </a:p>
+        </p:txBody>
+      </p:sp>
+      <p:sp>
+        <p:nvSpPr>
+          <p:cNvPr id="14" name="Rectangle 13"/>
           <p:cNvSpPr/>
           <p:nvPr/>
         </p:nvSpPr>
         <p:spPr>
           <a:xfrm>
-            <a:off x="731520" y="3712464"/>
-            <a:ext cx="384048" cy="384048"/>
-          </a:xfrm>
-          <a:prstGeom prst="ellipse">
+            <a:off x="457200" y="3035808"/>
+            <a:ext cx="1714500" cy="347472"/>
+          </a:xfrm>
+          <a:prstGeom prst="rect">
             <a:avLst/>
           </a:prstGeom>
           <a:solidFill>
-            <a:srgbClr val="2563EB"/>
+            <a:srgbClr val="F1F5F9"/>
           </a:solidFill>
-          <a:ln>
-            <a:noFill/>
+          <a:ln w="9525">
+            <a:solidFill>
+              <a:srgbClr val="E2E8F0"/>
+            </a:solidFill>
           </a:ln>
         </p:spPr>
         <p:style>
@@ -11131,14 +11436,14 @@
       </p:sp>
       <p:sp>
         <p:nvSpPr>
-          <p:cNvPr id="18" name="TextBox 17"/>
-          <p:cNvSpPr txBox="1"/>
-          <p:nvPr/>
-        </p:nvSpPr>
-        <p:spPr>
-          <a:xfrm>
-            <a:off x="731520" y="3712464"/>
-            <a:ext cx="384048" cy="384048"/>
+          <p:cNvPr id="15" name="TextBox 14"/>
+          <p:cNvSpPr txBox="1"/>
+          <p:nvPr/>
+        </p:nvSpPr>
+        <p:spPr>
+          <a:xfrm>
+            <a:off x="548640" y="3035808"/>
+            <a:ext cx="1531620" cy="347472"/>
           </a:xfrm>
           <a:prstGeom prst="rect">
             <a:avLst/>
@@ -11161,165 +11466,38 @@
               </a:spcAft>
             </a:pPr>
             <a:r>
-              <a:rPr sz="1000" b="1">
-                <a:solidFill>
-                  <a:srgbClr val="FFFFFF"/>
-                </a:solidFill>
-                <a:latin typeface="Calibri"/>
-              </a:rPr>
-              <a:t>04</a:t>
-            </a:r>
-          </a:p>
-        </p:txBody>
-      </p:sp>
-      <p:sp>
-        <p:nvSpPr>
-          <p:cNvPr id="19" name="TextBox 18"/>
-          <p:cNvSpPr txBox="1"/>
-          <p:nvPr/>
-        </p:nvSpPr>
-        <p:spPr>
-          <a:xfrm>
-            <a:off x="1280160" y="3657600"/>
-            <a:ext cx="6400800" cy="274320"/>
-          </a:xfrm>
-          <a:prstGeom prst="rect">
-            <a:avLst/>
-          </a:prstGeom>
-          <a:noFill/>
-        </p:spPr>
-        <p:txBody>
-          <a:bodyPr wrap="square"/>
-          <a:lstStyle/>
-          <a:p>
-            <a:pPr algn="l">
-              <a:lnSpc>
-                <a:spcPct val="135000"/>
-              </a:lnSpc>
-              <a:spcBef>
-                <a:spcPts val="0"/>
-              </a:spcBef>
-              <a:spcAft>
-                <a:spcPts val="0"/>
-              </a:spcAft>
-            </a:pPr>
-            <a:r>
-              <a:rPr sz="1200" b="1">
-                <a:solidFill>
-                  <a:srgbClr val="FFFFFF"/>
-                </a:solidFill>
-                <a:latin typeface="Calibri"/>
-              </a:rPr>
-              <a:t>Delivery &amp; Curation</a:t>
-            </a:r>
-          </a:p>
-        </p:txBody>
-      </p:sp>
-      <p:sp>
-        <p:nvSpPr>
-          <p:cNvPr id="20" name="TextBox 19"/>
-          <p:cNvSpPr txBox="1"/>
-          <p:nvPr/>
-        </p:nvSpPr>
-        <p:spPr>
-          <a:xfrm>
-            <a:off x="1280160" y="3950208"/>
-            <a:ext cx="6400800" cy="274320"/>
-          </a:xfrm>
-          <a:prstGeom prst="rect">
-            <a:avLst/>
-          </a:prstGeom>
-          <a:noFill/>
-        </p:spPr>
-        <p:txBody>
-          <a:bodyPr wrap="square"/>
-          <a:lstStyle/>
-          <a:p>
-            <a:pPr algn="l">
-              <a:lnSpc>
-                <a:spcPct val="135000"/>
-              </a:lnSpc>
-              <a:spcBef>
-                <a:spcPts val="0"/>
-              </a:spcBef>
-              <a:spcAft>
-                <a:spcPts val="0"/>
-              </a:spcAft>
-            </a:pPr>
-            <a:r>
-              <a:rPr sz="1000" b="0">
-                <a:solidFill>
-                  <a:srgbClr val="BBBBCC"/>
-                </a:solidFill>
-                <a:latin typeface="Calibri"/>
-              </a:rPr>
-              <a:t>Receive your artifact and begin ongoing curation support</a:t>
-            </a:r>
-          </a:p>
-        </p:txBody>
-      </p:sp>
-      <p:sp>
-        <p:nvSpPr>
-          <p:cNvPr id="21" name="TextBox 20"/>
-          <p:cNvSpPr txBox="1"/>
-          <p:nvPr/>
-        </p:nvSpPr>
-        <p:spPr>
-          <a:xfrm>
-            <a:off x="731520" y="4229100"/>
-            <a:ext cx="7315200" cy="274320"/>
-          </a:xfrm>
-          <a:prstGeom prst="rect">
-            <a:avLst/>
-          </a:prstGeom>
-          <a:noFill/>
-        </p:spPr>
-        <p:txBody>
-          <a:bodyPr wrap="square"/>
-          <a:lstStyle/>
-          <a:p>
-            <a:pPr algn="l">
-              <a:lnSpc>
-                <a:spcPct val="135000"/>
-              </a:lnSpc>
-              <a:spcBef>
-                <a:spcPts val="0"/>
-              </a:spcBef>
-              <a:spcAft>
-                <a:spcPts val="0"/>
-              </a:spcAft>
-            </a:pPr>
-            <a:r>
-              <a:rPr sz="1000" b="0">
-                <a:solidFill>
-                  <a:srgbClr val="94A3B8"/>
-                </a:solidFill>
-                <a:latin typeface="Calibri"/>
-              </a:rPr>
-              <a:t>Takuya Sato — Founder, TokiStorage</a:t>
-            </a:r>
-          </a:p>
-        </p:txBody>
-      </p:sp>
-      <p:sp>
-        <p:nvSpPr>
-          <p:cNvPr id="22" name="Rectangle 21"/>
+              <a:rPr sz="800" b="0">
+                <a:solidFill>
+                  <a:srgbClr val="475569"/>
+                </a:solidFill>
+                <a:latin typeface="Calibri"/>
+              </a:rPr>
+              <a:t>SoulCarrier founder</a:t>
+            </a:r>
+          </a:p>
+        </p:txBody>
+      </p:sp>
+      <p:sp>
+        <p:nvSpPr>
+          <p:cNvPr id="16" name="Rectangle 15"/>
           <p:cNvSpPr/>
           <p:nvPr/>
         </p:nvSpPr>
         <p:spPr>
           <a:xfrm>
-            <a:off x="0" y="4613148"/>
-            <a:ext cx="9144000" cy="6350"/>
+            <a:off x="2281428" y="3035808"/>
+            <a:ext cx="2057400" cy="347472"/>
           </a:xfrm>
           <a:prstGeom prst="rect">
             <a:avLst/>
           </a:prstGeom>
           <a:solidFill>
-            <a:srgbClr val="334455"/>
+            <a:srgbClr val="F1F5F9"/>
           </a:solidFill>
-          <a:ln>
-            <a:noFill/>
+          <a:ln w="9525">
+            <a:solidFill>
+              <a:srgbClr val="E2E8F0"/>
+            </a:solidFill>
           </a:ln>
         </p:spPr>
         <p:style>
@@ -11346,14 +11524,452 @@
       </p:sp>
       <p:sp>
         <p:nvSpPr>
+          <p:cNvPr id="17" name="TextBox 16"/>
+          <p:cNvSpPr txBox="1"/>
+          <p:nvPr/>
+        </p:nvSpPr>
+        <p:spPr>
+          <a:xfrm>
+            <a:off x="2372868" y="3035808"/>
+            <a:ext cx="1874520" cy="347472"/>
+          </a:xfrm>
+          <a:prstGeom prst="rect">
+            <a:avLst/>
+          </a:prstGeom>
+          <a:noFill/>
+        </p:spPr>
+        <p:txBody>
+          <a:bodyPr wrap="square" anchor="ctr"/>
+          <a:lstStyle/>
+          <a:p>
+            <a:pPr algn="ctr">
+              <a:lnSpc>
+                <a:spcPct val="135000"/>
+              </a:lnSpc>
+              <a:spcBef>
+                <a:spcPts val="0"/>
+              </a:spcBef>
+              <a:spcAft>
+                <a:spcPts val="0"/>
+              </a:spcAft>
+            </a:pPr>
+            <a:r>
+              <a:rPr sz="800" b="0">
+                <a:solidFill>
+                  <a:srgbClr val="475569"/>
+                </a:solidFill>
+                <a:latin typeface="Calibri"/>
+              </a:rPr>
+              <a:t>70+ philosophical essays</a:t>
+            </a:r>
+          </a:p>
+        </p:txBody>
+      </p:sp>
+      <p:sp>
+        <p:nvSpPr>
+          <p:cNvPr id="18" name="Rectangle 17"/>
+          <p:cNvSpPr/>
+          <p:nvPr/>
+        </p:nvSpPr>
+        <p:spPr>
+          <a:xfrm>
+            <a:off x="4448556" y="3035808"/>
+            <a:ext cx="1645919" cy="347472"/>
+          </a:xfrm>
+          <a:prstGeom prst="rect">
+            <a:avLst/>
+          </a:prstGeom>
+          <a:solidFill>
+            <a:srgbClr val="F1F5F9"/>
+          </a:solidFill>
+          <a:ln w="9525">
+            <a:solidFill>
+              <a:srgbClr val="E2E8F0"/>
+            </a:solidFill>
+          </a:ln>
+        </p:spPr>
+        <p:style>
+          <a:lnRef idx="1">
+            <a:schemeClr val="accent1"/>
+          </a:lnRef>
+          <a:fillRef idx="3">
+            <a:schemeClr val="accent1"/>
+          </a:fillRef>
+          <a:effectRef idx="2">
+            <a:schemeClr val="accent1"/>
+          </a:effectRef>
+          <a:fontRef idx="minor">
+            <a:schemeClr val="lt1"/>
+          </a:fontRef>
+        </p:style>
+        <p:txBody>
+          <a:bodyPr rtlCol="0" anchor="ctr"/>
+          <a:lstStyle/>
+          <a:p>
+            <a:pPr algn="ctr"/>
+          </a:p>
+        </p:txBody>
+      </p:sp>
+      <p:sp>
+        <p:nvSpPr>
+          <p:cNvPr id="19" name="TextBox 18"/>
+          <p:cNvSpPr txBox="1"/>
+          <p:nvPr/>
+        </p:nvSpPr>
+        <p:spPr>
+          <a:xfrm>
+            <a:off x="4539996" y="3035808"/>
+            <a:ext cx="1463039" cy="347472"/>
+          </a:xfrm>
+          <a:prstGeom prst="rect">
+            <a:avLst/>
+          </a:prstGeom>
+          <a:noFill/>
+        </p:spPr>
+        <p:txBody>
+          <a:bodyPr wrap="square" anchor="ctr"/>
+          <a:lstStyle/>
+          <a:p>
+            <a:pPr algn="ctr">
+              <a:lnSpc>
+                <a:spcPct val="135000"/>
+              </a:lnSpc>
+              <a:spcBef>
+                <a:spcPts val="0"/>
+              </a:spcBef>
+              <a:spcAft>
+                <a:spcPts val="0"/>
+              </a:spcAft>
+            </a:pPr>
+            <a:r>
+              <a:rPr sz="800" b="0">
+                <a:solidFill>
+                  <a:srgbClr val="475569"/>
+                </a:solidFill>
+                <a:latin typeface="Calibri"/>
+              </a:rPr>
+              <a:t>Off-grid validated</a:t>
+            </a:r>
+          </a:p>
+        </p:txBody>
+      </p:sp>
+      <p:sp>
+        <p:nvSpPr>
+          <p:cNvPr id="20" name="Rectangle 19"/>
+          <p:cNvSpPr/>
+          <p:nvPr/>
+        </p:nvSpPr>
+        <p:spPr>
+          <a:xfrm>
+            <a:off x="457200" y="3419856"/>
+            <a:ext cx="3086100" cy="347472"/>
+          </a:xfrm>
+          <a:prstGeom prst="rect">
+            <a:avLst/>
+          </a:prstGeom>
+          <a:solidFill>
+            <a:srgbClr val="F1F5F9"/>
+          </a:solidFill>
+          <a:ln w="9525">
+            <a:solidFill>
+              <a:srgbClr val="E2E8F0"/>
+            </a:solidFill>
+          </a:ln>
+        </p:spPr>
+        <p:style>
+          <a:lnRef idx="1">
+            <a:schemeClr val="accent1"/>
+          </a:lnRef>
+          <a:fillRef idx="3">
+            <a:schemeClr val="accent1"/>
+          </a:fillRef>
+          <a:effectRef idx="2">
+            <a:schemeClr val="accent1"/>
+          </a:effectRef>
+          <a:fontRef idx="minor">
+            <a:schemeClr val="lt1"/>
+          </a:fontRef>
+        </p:style>
+        <p:txBody>
+          <a:bodyPr rtlCol="0" anchor="ctr"/>
+          <a:lstStyle/>
+          <a:p>
+            <a:pPr algn="ctr"/>
+          </a:p>
+        </p:txBody>
+      </p:sp>
+      <p:sp>
+        <p:nvSpPr>
+          <p:cNvPr id="21" name="TextBox 20"/>
+          <p:cNvSpPr txBox="1"/>
+          <p:nvPr/>
+        </p:nvSpPr>
+        <p:spPr>
+          <a:xfrm>
+            <a:off x="548640" y="3419856"/>
+            <a:ext cx="2903220" cy="347472"/>
+          </a:xfrm>
+          <a:prstGeom prst="rect">
+            <a:avLst/>
+          </a:prstGeom>
+          <a:noFill/>
+        </p:spPr>
+        <p:txBody>
+          <a:bodyPr wrap="square" anchor="ctr"/>
+          <a:lstStyle/>
+          <a:p>
+            <a:pPr algn="ctr">
+              <a:lnSpc>
+                <a:spcPct val="135000"/>
+              </a:lnSpc>
+              <a:spcBef>
+                <a:spcPts val="0"/>
+              </a:spcBef>
+              <a:spcAft>
+                <a:spcPts val="0"/>
+              </a:spcAft>
+            </a:pPr>
+            <a:r>
+              <a:rPr sz="800" b="0">
+                <a:solidFill>
+                  <a:srgbClr val="475569"/>
+                </a:solidFill>
+                <a:latin typeface="Calibri"/>
+              </a:rPr>
+              <a:t>Relocating to Sado Island (Spring 2026)</a:t>
+            </a:r>
+          </a:p>
+        </p:txBody>
+      </p:sp>
+      <p:sp>
+        <p:nvSpPr>
+          <p:cNvPr id="22" name="Rectangle 21"/>
+          <p:cNvSpPr/>
+          <p:nvPr/>
+        </p:nvSpPr>
+        <p:spPr>
+          <a:xfrm>
+            <a:off x="3653028" y="3419856"/>
+            <a:ext cx="2606040" cy="347472"/>
+          </a:xfrm>
+          <a:prstGeom prst="rect">
+            <a:avLst/>
+          </a:prstGeom>
+          <a:solidFill>
+            <a:srgbClr val="F1F5F9"/>
+          </a:solidFill>
+          <a:ln w="9525">
+            <a:solidFill>
+              <a:srgbClr val="E2E8F0"/>
+            </a:solidFill>
+          </a:ln>
+        </p:spPr>
+        <p:style>
+          <a:lnRef idx="1">
+            <a:schemeClr val="accent1"/>
+          </a:lnRef>
+          <a:fillRef idx="3">
+            <a:schemeClr val="accent1"/>
+          </a:fillRef>
+          <a:effectRef idx="2">
+            <a:schemeClr val="accent1"/>
+          </a:effectRef>
+          <a:fontRef idx="minor">
+            <a:schemeClr val="lt1"/>
+          </a:fontRef>
+        </p:style>
+        <p:txBody>
+          <a:bodyPr rtlCol="0" anchor="ctr"/>
+          <a:lstStyle/>
+          <a:p>
+            <a:pPr algn="ctr"/>
+          </a:p>
+        </p:txBody>
+      </p:sp>
+      <p:sp>
+        <p:nvSpPr>
           <p:cNvPr id="23" name="TextBox 22"/>
           <p:cNvSpPr txBox="1"/>
           <p:nvPr/>
         </p:nvSpPr>
         <p:spPr>
           <a:xfrm>
-            <a:off x="457200" y="4640580"/>
-            <a:ext cx="3657600" cy="320040"/>
+            <a:off x="3744468" y="3419856"/>
+            <a:ext cx="2423160" cy="347472"/>
+          </a:xfrm>
+          <a:prstGeom prst="rect">
+            <a:avLst/>
+          </a:prstGeom>
+          <a:noFill/>
+        </p:spPr>
+        <p:txBody>
+          <a:bodyPr wrap="square" anchor="ctr"/>
+          <a:lstStyle/>
+          <a:p>
+            <a:pPr algn="ctr">
+              <a:lnSpc>
+                <a:spcPct val="135000"/>
+              </a:lnSpc>
+              <a:spcBef>
+                <a:spcPts val="0"/>
+              </a:spcBef>
+              <a:spcAft>
+                <a:spcPts val="0"/>
+              </a:spcAft>
+            </a:pPr>
+            <a:r>
+              <a:rPr sz="800" b="0">
+                <a:solidFill>
+                  <a:srgbClr val="475569"/>
+                </a:solidFill>
+                <a:latin typeface="Calibri"/>
+              </a:rPr>
+              <a:t>Ise Grand Shrine offering (2026)</a:t>
+            </a:r>
+          </a:p>
+        </p:txBody>
+      </p:sp>
+      <p:sp>
+        <p:nvSpPr>
+          <p:cNvPr id="24" name="Rectangle 23"/>
+          <p:cNvSpPr/>
+          <p:nvPr/>
+        </p:nvSpPr>
+        <p:spPr>
+          <a:xfrm>
+            <a:off x="457200" y="3803904"/>
+            <a:ext cx="3154680" cy="347472"/>
+          </a:xfrm>
+          <a:prstGeom prst="rect">
+            <a:avLst/>
+          </a:prstGeom>
+          <a:solidFill>
+            <a:srgbClr val="F1F5F9"/>
+          </a:solidFill>
+          <a:ln w="9525">
+            <a:solidFill>
+              <a:srgbClr val="E2E8F0"/>
+            </a:solidFill>
+          </a:ln>
+        </p:spPr>
+        <p:style>
+          <a:lnRef idx="1">
+            <a:schemeClr val="accent1"/>
+          </a:lnRef>
+          <a:fillRef idx="3">
+            <a:schemeClr val="accent1"/>
+          </a:fillRef>
+          <a:effectRef idx="2">
+            <a:schemeClr val="accent1"/>
+          </a:effectRef>
+          <a:fontRef idx="minor">
+            <a:schemeClr val="lt1"/>
+          </a:fontRef>
+        </p:style>
+        <p:txBody>
+          <a:bodyPr rtlCol="0" anchor="ctr"/>
+          <a:lstStyle/>
+          <a:p>
+            <a:pPr algn="ctr"/>
+          </a:p>
+        </p:txBody>
+      </p:sp>
+      <p:sp>
+        <p:nvSpPr>
+          <p:cNvPr id="25" name="TextBox 24"/>
+          <p:cNvSpPr txBox="1"/>
+          <p:nvPr/>
+        </p:nvSpPr>
+        <p:spPr>
+          <a:xfrm>
+            <a:off x="548640" y="3803904"/>
+            <a:ext cx="2971800" cy="347472"/>
+          </a:xfrm>
+          <a:prstGeom prst="rect">
+            <a:avLst/>
+          </a:prstGeom>
+          <a:noFill/>
+        </p:spPr>
+        <p:txBody>
+          <a:bodyPr wrap="square" anchor="ctr"/>
+          <a:lstStyle/>
+          <a:p>
+            <a:pPr algn="ctr">
+              <a:lnSpc>
+                <a:spcPct val="135000"/>
+              </a:lnSpc>
+              <a:spcBef>
+                <a:spcPts val="0"/>
+              </a:spcBef>
+              <a:spcAft>
+                <a:spcPts val="0"/>
+              </a:spcAft>
+            </a:pPr>
+            <a:r>
+              <a:rPr sz="800" b="0">
+                <a:solidFill>
+                  <a:srgbClr val="475569"/>
+                </a:solidFill>
+                <a:latin typeface="Calibri"/>
+              </a:rPr>
+              <a:t>Enryaku-ji Eternal Light offering (2026)</a:t>
+            </a:r>
+          </a:p>
+        </p:txBody>
+      </p:sp>
+      <p:sp>
+        <p:nvSpPr>
+          <p:cNvPr id="26" name="Rectangle 25"/>
+          <p:cNvSpPr/>
+          <p:nvPr/>
+        </p:nvSpPr>
+        <p:spPr>
+          <a:xfrm>
+            <a:off x="0" y="4796028"/>
+            <a:ext cx="9144000" cy="6350"/>
+          </a:xfrm>
+          <a:prstGeom prst="rect">
+            <a:avLst/>
+          </a:prstGeom>
+          <a:solidFill>
+            <a:srgbClr val="E2E8F0"/>
+          </a:solidFill>
+          <a:ln>
+            <a:noFill/>
+          </a:ln>
+        </p:spPr>
+        <p:style>
+          <a:lnRef idx="1">
+            <a:schemeClr val="accent1"/>
+          </a:lnRef>
+          <a:fillRef idx="3">
+            <a:schemeClr val="accent1"/>
+          </a:fillRef>
+          <a:effectRef idx="2">
+            <a:schemeClr val="accent1"/>
+          </a:effectRef>
+          <a:fontRef idx="minor">
+            <a:schemeClr val="lt1"/>
+          </a:fontRef>
+        </p:style>
+        <p:txBody>
+          <a:bodyPr rtlCol="0" anchor="ctr"/>
+          <a:lstStyle/>
+          <a:p>
+            <a:pPr algn="ctr"/>
+          </a:p>
+        </p:txBody>
+      </p:sp>
+      <p:sp>
+        <p:nvSpPr>
+          <p:cNvPr id="27" name="TextBox 26"/>
+          <p:cNvSpPr txBox="1"/>
+          <p:nvPr/>
+        </p:nvSpPr>
+        <p:spPr>
+          <a:xfrm>
+            <a:off x="457200" y="4821428"/>
+            <a:ext cx="3657600" cy="274320"/>
           </a:xfrm>
           <a:prstGeom prst="rect">
             <a:avLst/>
@@ -11382,21 +11998,21 @@
                 </a:solidFill>
                 <a:latin typeface="Calibri"/>
               </a:rPr>
-              <a:t>TokiStorage</a:t>
-            </a:r>
-          </a:p>
-        </p:txBody>
-      </p:sp>
-      <p:sp>
-        <p:nvSpPr>
-          <p:cNvPr id="24" name="TextBox 23"/>
-          <p:cNvSpPr txBox="1"/>
-          <p:nvPr/>
-        </p:nvSpPr>
-        <p:spPr>
-          <a:xfrm>
-            <a:off x="3657600" y="4640580"/>
-            <a:ext cx="1828800" cy="320040"/>
+              <a:t>Timeless Consulting</a:t>
+            </a:r>
+          </a:p>
+        </p:txBody>
+      </p:sp>
+      <p:sp>
+        <p:nvSpPr>
+          <p:cNvPr id="28" name="TextBox 27"/>
+          <p:cNvSpPr txBox="1"/>
+          <p:nvPr/>
+        </p:nvSpPr>
+        <p:spPr>
+          <a:xfrm>
+            <a:off x="3657600" y="4821428"/>
+            <a:ext cx="1828800" cy="274320"/>
           </a:xfrm>
           <a:prstGeom prst="rect">
             <a:avLst/>
@@ -11432,14 +12048,14 @@
       </p:sp>
       <p:sp>
         <p:nvSpPr>
-          <p:cNvPr id="25" name="TextBox 24"/>
-          <p:cNvSpPr txBox="1"/>
-          <p:nvPr/>
-        </p:nvSpPr>
-        <p:spPr>
-          <a:xfrm>
-            <a:off x="8229600" y="4640580"/>
-            <a:ext cx="457200" cy="320040"/>
+          <p:cNvPr id="29" name="TextBox 28"/>
+          <p:cNvSpPr txBox="1"/>
+          <p:nvPr/>
+        </p:nvSpPr>
+        <p:spPr>
+          <a:xfrm>
+            <a:off x="8229600" y="4821428"/>
+            <a:ext cx="457200" cy="274320"/>
           </a:xfrm>
           <a:prstGeom prst="rect">
             <a:avLst/>
@@ -11506,7 +12122,7 @@
             <a:avLst/>
           </a:prstGeom>
           <a:solidFill>
-            <a:srgbClr val="F8FAFC"/>
+            <a:srgbClr val="1E293B"/>
           </a:solidFill>
           <a:ln>
             <a:noFill/>
@@ -11542,8 +12158,8 @@
         </p:nvSpPr>
         <p:spPr>
           <a:xfrm>
-            <a:off x="914400" y="914400"/>
-            <a:ext cx="7315200" cy="411480"/>
+            <a:off x="457200" y="137160"/>
+            <a:ext cx="3657600" cy="411480"/>
           </a:xfrm>
           <a:prstGeom prst="rect">
             <a:avLst/>
@@ -11566,33 +12182,76 @@
               </a:spcAft>
             </a:pPr>
             <a:r>
-              <a:rPr sz="1400" b="1">
-                <a:solidFill>
-                  <a:srgbClr val="94A3B8"/>
-                </a:solidFill>
-                <a:latin typeface="Calibri"/>
-              </a:rPr>
-              <a:t>Confidential / Disclaimer</a:t>
-            </a:r>
-          </a:p>
-        </p:txBody>
-      </p:sp>
-      <p:sp>
-        <p:nvSpPr>
-          <p:cNvPr id="4" name="Rectangle 3"/>
+              <a:rPr sz="1300" b="1">
+                <a:solidFill>
+                  <a:srgbClr val="FFFFFF"/>
+                </a:solidFill>
+                <a:latin typeface="Calibri"/>
+              </a:rPr>
+              <a:t>Next Step</a:t>
+            </a:r>
+          </a:p>
+        </p:txBody>
+      </p:sp>
+      <p:sp>
+        <p:nvSpPr>
+          <p:cNvPr id="4" name="TextBox 3"/>
+          <p:cNvSpPr txBox="1"/>
+          <p:nvPr/>
+        </p:nvSpPr>
+        <p:spPr>
+          <a:xfrm>
+            <a:off x="457200" y="777240"/>
+            <a:ext cx="7315200" cy="457200"/>
+          </a:xfrm>
+          <a:prstGeom prst="rect">
+            <a:avLst/>
+          </a:prstGeom>
+          <a:noFill/>
+        </p:spPr>
+        <p:txBody>
+          <a:bodyPr wrap="square"/>
+          <a:lstStyle/>
+          <a:p>
+            <a:pPr algn="l">
+              <a:lnSpc>
+                <a:spcPct val="135000"/>
+              </a:lnSpc>
+              <a:spcBef>
+                <a:spcPts val="0"/>
+              </a:spcBef>
+              <a:spcAft>
+                <a:spcPts val="0"/>
+              </a:spcAft>
+            </a:pPr>
+            <a:r>
+              <a:rPr sz="2000" b="1">
+                <a:solidFill>
+                  <a:srgbClr val="FFFFFF"/>
+                </a:solidFill>
+                <a:latin typeface="Calibri"/>
+              </a:rPr>
+              <a:t>Let's start with a conversation.</a:t>
+            </a:r>
+          </a:p>
+        </p:txBody>
+      </p:sp>
+      <p:sp>
+        <p:nvSpPr>
+          <p:cNvPr id="5" name="Oval 4"/>
           <p:cNvSpPr/>
           <p:nvPr/>
         </p:nvSpPr>
         <p:spPr>
           <a:xfrm>
-            <a:off x="914400" y="1371600"/>
-            <a:ext cx="7315200" cy="6350"/>
-          </a:xfrm>
-          <a:prstGeom prst="rect">
+            <a:off x="731520" y="1572768"/>
+            <a:ext cx="384048" cy="384048"/>
+          </a:xfrm>
+          <a:prstGeom prst="ellipse">
             <a:avLst/>
           </a:prstGeom>
           <a:solidFill>
-            <a:srgbClr val="E2E8F0"/>
+            <a:srgbClr val="2563EB"/>
           </a:solidFill>
           <a:ln>
             <a:noFill/>
@@ -11622,14 +12281,57 @@
       </p:sp>
       <p:sp>
         <p:nvSpPr>
-          <p:cNvPr id="5" name="TextBox 4"/>
-          <p:cNvSpPr txBox="1"/>
-          <p:nvPr/>
-        </p:nvSpPr>
-        <p:spPr>
-          <a:xfrm>
-            <a:off x="914400" y="1554480"/>
-            <a:ext cx="7315200" cy="2560320"/>
+          <p:cNvPr id="6" name="TextBox 5"/>
+          <p:cNvSpPr txBox="1"/>
+          <p:nvPr/>
+        </p:nvSpPr>
+        <p:spPr>
+          <a:xfrm>
+            <a:off x="731520" y="1572768"/>
+            <a:ext cx="384048" cy="384048"/>
+          </a:xfrm>
+          <a:prstGeom prst="rect">
+            <a:avLst/>
+          </a:prstGeom>
+          <a:noFill/>
+        </p:spPr>
+        <p:txBody>
+          <a:bodyPr wrap="square" anchor="ctr"/>
+          <a:lstStyle/>
+          <a:p>
+            <a:pPr algn="ctr">
+              <a:lnSpc>
+                <a:spcPct val="135000"/>
+              </a:lnSpc>
+              <a:spcBef>
+                <a:spcPts val="0"/>
+              </a:spcBef>
+              <a:spcAft>
+                <a:spcPts val="0"/>
+              </a:spcAft>
+            </a:pPr>
+            <a:r>
+              <a:rPr sz="1000" b="1">
+                <a:solidFill>
+                  <a:srgbClr val="FFFFFF"/>
+                </a:solidFill>
+                <a:latin typeface="Calibri"/>
+              </a:rPr>
+              <a:t>01</a:t>
+            </a:r>
+          </a:p>
+        </p:txBody>
+      </p:sp>
+      <p:sp>
+        <p:nvSpPr>
+          <p:cNvPr id="7" name="TextBox 6"/>
+          <p:cNvSpPr txBox="1"/>
+          <p:nvPr/>
+        </p:nvSpPr>
+        <p:spPr>
+          <a:xfrm>
+            <a:off x="1280160" y="1517904"/>
+            <a:ext cx="6400800" cy="274320"/>
           </a:xfrm>
           <a:prstGeom prst="rect">
             <a:avLst/>
@@ -11652,29 +12354,27 @@
               </a:spcAft>
             </a:pPr>
             <a:r>
-              <a:rPr sz="900" b="0">
-                <a:solidFill>
-                  <a:srgbClr val="475569"/>
-                </a:solidFill>
-                <a:latin typeface="Calibri"/>
-              </a:rPr>
-              <a:t>This document has been prepared by TokiStorage (Takuya Sato) for the purpose of introducing our consulting services.
-The information contained herein reflects current views and plans and does not constitute a guarantee of accuracy, completeness, or future outcomes.
-This document is provided for informational purposes only and does not constitute legal, investment, or other professional advice.</a:t>
-            </a:r>
-          </a:p>
-        </p:txBody>
-      </p:sp>
-      <p:sp>
-        <p:nvSpPr>
-          <p:cNvPr id="6" name="TextBox 5"/>
-          <p:cNvSpPr txBox="1"/>
-          <p:nvPr/>
-        </p:nvSpPr>
-        <p:spPr>
-          <a:xfrm>
-            <a:off x="914400" y="4046220"/>
-            <a:ext cx="7315200" cy="274320"/>
+              <a:rPr sz="1200" b="1">
+                <a:solidFill>
+                  <a:srgbClr val="FFFFFF"/>
+                </a:solidFill>
+                <a:latin typeface="Calibri"/>
+              </a:rPr>
+              <a:t>Initial Dialogue (90 min, complimentary)</a:t>
+            </a:r>
+          </a:p>
+        </p:txBody>
+      </p:sp>
+      <p:sp>
+        <p:nvSpPr>
+          <p:cNvPr id="8" name="TextBox 7"/>
+          <p:cNvSpPr txBox="1"/>
+          <p:nvPr/>
+        </p:nvSpPr>
+        <p:spPr>
+          <a:xfrm>
+            <a:off x="1280160" y="1810512"/>
+            <a:ext cx="6400800" cy="274320"/>
           </a:xfrm>
           <a:prstGeom prst="rect">
             <a:avLst/>
@@ -11697,33 +12397,33 @@
               </a:spcAft>
             </a:pPr>
             <a:r>
-              <a:rPr sz="800" b="0">
-                <a:solidFill>
-                  <a:srgbClr val="94A3B8"/>
-                </a:solidFill>
-                <a:latin typeface="Calibri"/>
-              </a:rPr>
-              <a:t>© 2026 TokiStorage / Takuya Sato. All rights reserved.</a:t>
-            </a:r>
-          </a:p>
-        </p:txBody>
-      </p:sp>
-      <p:sp>
-        <p:nvSpPr>
-          <p:cNvPr id="7" name="Rectangle 6"/>
+              <a:rPr sz="1000" b="0">
+                <a:solidFill>
+                  <a:srgbClr val="BBBBCC"/>
+                </a:solidFill>
+                <a:latin typeface="Calibri"/>
+              </a:rPr>
+              <a:t>Explore "What will you preserve for 100 years?" together</a:t>
+            </a:r>
+          </a:p>
+        </p:txBody>
+      </p:sp>
+      <p:sp>
+        <p:nvSpPr>
+          <p:cNvPr id="9" name="Oval 8"/>
           <p:cNvSpPr/>
           <p:nvPr/>
         </p:nvSpPr>
         <p:spPr>
           <a:xfrm>
-            <a:off x="0" y="4796028"/>
-            <a:ext cx="9144000" cy="6350"/>
-          </a:xfrm>
-          <a:prstGeom prst="rect">
+            <a:off x="731520" y="2286000"/>
+            <a:ext cx="384048" cy="384048"/>
+          </a:xfrm>
+          <a:prstGeom prst="ellipse">
             <a:avLst/>
           </a:prstGeom>
           <a:solidFill>
-            <a:srgbClr val="E2E8F0"/>
+            <a:srgbClr val="2563EB"/>
           </a:solidFill>
           <a:ln>
             <a:noFill/>
@@ -11753,14 +12453,57 @@
       </p:sp>
       <p:sp>
         <p:nvSpPr>
-          <p:cNvPr id="8" name="TextBox 7"/>
-          <p:cNvSpPr txBox="1"/>
-          <p:nvPr/>
-        </p:nvSpPr>
-        <p:spPr>
-          <a:xfrm>
-            <a:off x="457200" y="4821428"/>
-            <a:ext cx="3657600" cy="274320"/>
+          <p:cNvPr id="10" name="TextBox 9"/>
+          <p:cNvSpPr txBox="1"/>
+          <p:nvPr/>
+        </p:nvSpPr>
+        <p:spPr>
+          <a:xfrm>
+            <a:off x="731520" y="2286000"/>
+            <a:ext cx="384048" cy="384048"/>
+          </a:xfrm>
+          <a:prstGeom prst="rect">
+            <a:avLst/>
+          </a:prstGeom>
+          <a:noFill/>
+        </p:spPr>
+        <p:txBody>
+          <a:bodyPr wrap="square" anchor="ctr"/>
+          <a:lstStyle/>
+          <a:p>
+            <a:pPr algn="ctr">
+              <a:lnSpc>
+                <a:spcPct val="135000"/>
+              </a:lnSpc>
+              <a:spcBef>
+                <a:spcPts val="0"/>
+              </a:spcBef>
+              <a:spcAft>
+                <a:spcPts val="0"/>
+              </a:spcAft>
+            </a:pPr>
+            <a:r>
+              <a:rPr sz="1000" b="1">
+                <a:solidFill>
+                  <a:srgbClr val="FFFFFF"/>
+                </a:solidFill>
+                <a:latin typeface="Calibri"/>
+              </a:rPr>
+              <a:t>02</a:t>
+            </a:r>
+          </a:p>
+        </p:txBody>
+      </p:sp>
+      <p:sp>
+        <p:nvSpPr>
+          <p:cNvPr id="11" name="TextBox 10"/>
+          <p:cNvSpPr txBox="1"/>
+          <p:nvPr/>
+        </p:nvSpPr>
+        <p:spPr>
+          <a:xfrm>
+            <a:off x="1280160" y="2231136"/>
+            <a:ext cx="6400800" cy="274320"/>
           </a:xfrm>
           <a:prstGeom prst="rect">
             <a:avLst/>
@@ -11783,6 +12526,522 @@
               </a:spcAft>
             </a:pPr>
             <a:r>
+              <a:rPr sz="1200" b="1">
+                <a:solidFill>
+                  <a:srgbClr val="FFFFFF"/>
+                </a:solidFill>
+                <a:latin typeface="Calibri"/>
+              </a:rPr>
+              <a:t>Design Proposal</a:t>
+            </a:r>
+          </a:p>
+        </p:txBody>
+      </p:sp>
+      <p:sp>
+        <p:nvSpPr>
+          <p:cNvPr id="12" name="TextBox 11"/>
+          <p:cNvSpPr txBox="1"/>
+          <p:nvPr/>
+        </p:nvSpPr>
+        <p:spPr>
+          <a:xfrm>
+            <a:off x="1280160" y="2523744"/>
+            <a:ext cx="6400800" cy="274320"/>
+          </a:xfrm>
+          <a:prstGeom prst="rect">
+            <a:avLst/>
+          </a:prstGeom>
+          <a:noFill/>
+        </p:spPr>
+        <p:txBody>
+          <a:bodyPr wrap="square"/>
+          <a:lstStyle/>
+          <a:p>
+            <a:pPr algn="l">
+              <a:lnSpc>
+                <a:spcPct val="135000"/>
+              </a:lnSpc>
+              <a:spcBef>
+                <a:spcPts val="0"/>
+              </a:spcBef>
+              <a:spcAft>
+                <a:spcPts val="0"/>
+              </a:spcAft>
+            </a:pPr>
+            <a:r>
+              <a:rPr sz="1000" b="0">
+                <a:solidFill>
+                  <a:srgbClr val="BBBBCC"/>
+                </a:solidFill>
+                <a:latin typeface="Calibri"/>
+              </a:rPr>
+              <a:t>A personalized proof of existence plan based on our dialogue</a:t>
+            </a:r>
+          </a:p>
+        </p:txBody>
+      </p:sp>
+      <p:sp>
+        <p:nvSpPr>
+          <p:cNvPr id="13" name="Oval 12"/>
+          <p:cNvSpPr/>
+          <p:nvPr/>
+        </p:nvSpPr>
+        <p:spPr>
+          <a:xfrm>
+            <a:off x="731520" y="2999232"/>
+            <a:ext cx="384048" cy="384048"/>
+          </a:xfrm>
+          <a:prstGeom prst="ellipse">
+            <a:avLst/>
+          </a:prstGeom>
+          <a:solidFill>
+            <a:srgbClr val="2563EB"/>
+          </a:solidFill>
+          <a:ln>
+            <a:noFill/>
+          </a:ln>
+        </p:spPr>
+        <p:style>
+          <a:lnRef idx="1">
+            <a:schemeClr val="accent1"/>
+          </a:lnRef>
+          <a:fillRef idx="3">
+            <a:schemeClr val="accent1"/>
+          </a:fillRef>
+          <a:effectRef idx="2">
+            <a:schemeClr val="accent1"/>
+          </a:effectRef>
+          <a:fontRef idx="minor">
+            <a:schemeClr val="lt1"/>
+          </a:fontRef>
+        </p:style>
+        <p:txBody>
+          <a:bodyPr rtlCol="0" anchor="ctr"/>
+          <a:lstStyle/>
+          <a:p>
+            <a:pPr algn="ctr"/>
+          </a:p>
+        </p:txBody>
+      </p:sp>
+      <p:sp>
+        <p:nvSpPr>
+          <p:cNvPr id="14" name="TextBox 13"/>
+          <p:cNvSpPr txBox="1"/>
+          <p:nvPr/>
+        </p:nvSpPr>
+        <p:spPr>
+          <a:xfrm>
+            <a:off x="731520" y="2999232"/>
+            <a:ext cx="384048" cy="384048"/>
+          </a:xfrm>
+          <a:prstGeom prst="rect">
+            <a:avLst/>
+          </a:prstGeom>
+          <a:noFill/>
+        </p:spPr>
+        <p:txBody>
+          <a:bodyPr wrap="square" anchor="ctr"/>
+          <a:lstStyle/>
+          <a:p>
+            <a:pPr algn="ctr">
+              <a:lnSpc>
+                <a:spcPct val="135000"/>
+              </a:lnSpc>
+              <a:spcBef>
+                <a:spcPts val="0"/>
+              </a:spcBef>
+              <a:spcAft>
+                <a:spcPts val="0"/>
+              </a:spcAft>
+            </a:pPr>
+            <a:r>
+              <a:rPr sz="1000" b="1">
+                <a:solidFill>
+                  <a:srgbClr val="FFFFFF"/>
+                </a:solidFill>
+                <a:latin typeface="Calibri"/>
+              </a:rPr>
+              <a:t>03</a:t>
+            </a:r>
+          </a:p>
+        </p:txBody>
+      </p:sp>
+      <p:sp>
+        <p:nvSpPr>
+          <p:cNvPr id="15" name="TextBox 14"/>
+          <p:cNvSpPr txBox="1"/>
+          <p:nvPr/>
+        </p:nvSpPr>
+        <p:spPr>
+          <a:xfrm>
+            <a:off x="1280160" y="2944368"/>
+            <a:ext cx="6400800" cy="274320"/>
+          </a:xfrm>
+          <a:prstGeom prst="rect">
+            <a:avLst/>
+          </a:prstGeom>
+          <a:noFill/>
+        </p:spPr>
+        <p:txBody>
+          <a:bodyPr wrap="square"/>
+          <a:lstStyle/>
+          <a:p>
+            <a:pPr algn="l">
+              <a:lnSpc>
+                <a:spcPct val="135000"/>
+              </a:lnSpc>
+              <a:spcBef>
+                <a:spcPts val="0"/>
+              </a:spcBef>
+              <a:spcAft>
+                <a:spcPts val="0"/>
+              </a:spcAft>
+            </a:pPr>
+            <a:r>
+              <a:rPr sz="1200" b="1">
+                <a:solidFill>
+                  <a:srgbClr val="FFFFFF"/>
+                </a:solidFill>
+                <a:latin typeface="Calibri"/>
+              </a:rPr>
+              <a:t>Creation &amp; Inscription</a:t>
+            </a:r>
+          </a:p>
+        </p:txBody>
+      </p:sp>
+      <p:sp>
+        <p:nvSpPr>
+          <p:cNvPr id="16" name="TextBox 15"/>
+          <p:cNvSpPr txBox="1"/>
+          <p:nvPr/>
+        </p:nvSpPr>
+        <p:spPr>
+          <a:xfrm>
+            <a:off x="1280160" y="3236976"/>
+            <a:ext cx="6400800" cy="274320"/>
+          </a:xfrm>
+          <a:prstGeom prst="rect">
+            <a:avLst/>
+          </a:prstGeom>
+          <a:noFill/>
+        </p:spPr>
+        <p:txBody>
+          <a:bodyPr wrap="square"/>
+          <a:lstStyle/>
+          <a:p>
+            <a:pPr algn="l">
+              <a:lnSpc>
+                <a:spcPct val="135000"/>
+              </a:lnSpc>
+              <a:spcBef>
+                <a:spcPts val="0"/>
+              </a:spcBef>
+              <a:spcAft>
+                <a:spcPts val="0"/>
+              </a:spcAft>
+            </a:pPr>
+            <a:r>
+              <a:rPr sz="1000" b="0">
+                <a:solidFill>
+                  <a:srgbClr val="BBBBCC"/>
+                </a:solidFill>
+                <a:latin typeface="Calibri"/>
+              </a:rPr>
+              <a:t>Produce and permanently inscribe in quartz glass</a:t>
+            </a:r>
+          </a:p>
+        </p:txBody>
+      </p:sp>
+      <p:sp>
+        <p:nvSpPr>
+          <p:cNvPr id="17" name="Oval 16"/>
+          <p:cNvSpPr/>
+          <p:nvPr/>
+        </p:nvSpPr>
+        <p:spPr>
+          <a:xfrm>
+            <a:off x="731520" y="3712464"/>
+            <a:ext cx="384048" cy="384048"/>
+          </a:xfrm>
+          <a:prstGeom prst="ellipse">
+            <a:avLst/>
+          </a:prstGeom>
+          <a:solidFill>
+            <a:srgbClr val="2563EB"/>
+          </a:solidFill>
+          <a:ln>
+            <a:noFill/>
+          </a:ln>
+        </p:spPr>
+        <p:style>
+          <a:lnRef idx="1">
+            <a:schemeClr val="accent1"/>
+          </a:lnRef>
+          <a:fillRef idx="3">
+            <a:schemeClr val="accent1"/>
+          </a:fillRef>
+          <a:effectRef idx="2">
+            <a:schemeClr val="accent1"/>
+          </a:effectRef>
+          <a:fontRef idx="minor">
+            <a:schemeClr val="lt1"/>
+          </a:fontRef>
+        </p:style>
+        <p:txBody>
+          <a:bodyPr rtlCol="0" anchor="ctr"/>
+          <a:lstStyle/>
+          <a:p>
+            <a:pPr algn="ctr"/>
+          </a:p>
+        </p:txBody>
+      </p:sp>
+      <p:sp>
+        <p:nvSpPr>
+          <p:cNvPr id="18" name="TextBox 17"/>
+          <p:cNvSpPr txBox="1"/>
+          <p:nvPr/>
+        </p:nvSpPr>
+        <p:spPr>
+          <a:xfrm>
+            <a:off x="731520" y="3712464"/>
+            <a:ext cx="384048" cy="384048"/>
+          </a:xfrm>
+          <a:prstGeom prst="rect">
+            <a:avLst/>
+          </a:prstGeom>
+          <a:noFill/>
+        </p:spPr>
+        <p:txBody>
+          <a:bodyPr wrap="square" anchor="ctr"/>
+          <a:lstStyle/>
+          <a:p>
+            <a:pPr algn="ctr">
+              <a:lnSpc>
+                <a:spcPct val="135000"/>
+              </a:lnSpc>
+              <a:spcBef>
+                <a:spcPts val="0"/>
+              </a:spcBef>
+              <a:spcAft>
+                <a:spcPts val="0"/>
+              </a:spcAft>
+            </a:pPr>
+            <a:r>
+              <a:rPr sz="1000" b="1">
+                <a:solidFill>
+                  <a:srgbClr val="FFFFFF"/>
+                </a:solidFill>
+                <a:latin typeface="Calibri"/>
+              </a:rPr>
+              <a:t>04</a:t>
+            </a:r>
+          </a:p>
+        </p:txBody>
+      </p:sp>
+      <p:sp>
+        <p:nvSpPr>
+          <p:cNvPr id="19" name="TextBox 18"/>
+          <p:cNvSpPr txBox="1"/>
+          <p:nvPr/>
+        </p:nvSpPr>
+        <p:spPr>
+          <a:xfrm>
+            <a:off x="1280160" y="3657600"/>
+            <a:ext cx="6400800" cy="274320"/>
+          </a:xfrm>
+          <a:prstGeom prst="rect">
+            <a:avLst/>
+          </a:prstGeom>
+          <a:noFill/>
+        </p:spPr>
+        <p:txBody>
+          <a:bodyPr wrap="square"/>
+          <a:lstStyle/>
+          <a:p>
+            <a:pPr algn="l">
+              <a:lnSpc>
+                <a:spcPct val="135000"/>
+              </a:lnSpc>
+              <a:spcBef>
+                <a:spcPts val="0"/>
+              </a:spcBef>
+              <a:spcAft>
+                <a:spcPts val="0"/>
+              </a:spcAft>
+            </a:pPr>
+            <a:r>
+              <a:rPr sz="1200" b="1">
+                <a:solidFill>
+                  <a:srgbClr val="FFFFFF"/>
+                </a:solidFill>
+                <a:latin typeface="Calibri"/>
+              </a:rPr>
+              <a:t>Delivery &amp; Curation</a:t>
+            </a:r>
+          </a:p>
+        </p:txBody>
+      </p:sp>
+      <p:sp>
+        <p:nvSpPr>
+          <p:cNvPr id="20" name="TextBox 19"/>
+          <p:cNvSpPr txBox="1"/>
+          <p:nvPr/>
+        </p:nvSpPr>
+        <p:spPr>
+          <a:xfrm>
+            <a:off x="1280160" y="3950208"/>
+            <a:ext cx="6400800" cy="274320"/>
+          </a:xfrm>
+          <a:prstGeom prst="rect">
+            <a:avLst/>
+          </a:prstGeom>
+          <a:noFill/>
+        </p:spPr>
+        <p:txBody>
+          <a:bodyPr wrap="square"/>
+          <a:lstStyle/>
+          <a:p>
+            <a:pPr algn="l">
+              <a:lnSpc>
+                <a:spcPct val="135000"/>
+              </a:lnSpc>
+              <a:spcBef>
+                <a:spcPts val="0"/>
+              </a:spcBef>
+              <a:spcAft>
+                <a:spcPts val="0"/>
+              </a:spcAft>
+            </a:pPr>
+            <a:r>
+              <a:rPr sz="1000" b="0">
+                <a:solidFill>
+                  <a:srgbClr val="BBBBCC"/>
+                </a:solidFill>
+                <a:latin typeface="Calibri"/>
+              </a:rPr>
+              <a:t>Receive your artifact and begin ongoing curation support</a:t>
+            </a:r>
+          </a:p>
+        </p:txBody>
+      </p:sp>
+      <p:sp>
+        <p:nvSpPr>
+          <p:cNvPr id="21" name="TextBox 20"/>
+          <p:cNvSpPr txBox="1"/>
+          <p:nvPr/>
+        </p:nvSpPr>
+        <p:spPr>
+          <a:xfrm>
+            <a:off x="731520" y="4229100"/>
+            <a:ext cx="7315200" cy="274320"/>
+          </a:xfrm>
+          <a:prstGeom prst="rect">
+            <a:avLst/>
+          </a:prstGeom>
+          <a:noFill/>
+        </p:spPr>
+        <p:txBody>
+          <a:bodyPr wrap="square"/>
+          <a:lstStyle/>
+          <a:p>
+            <a:pPr algn="l">
+              <a:lnSpc>
+                <a:spcPct val="135000"/>
+              </a:lnSpc>
+              <a:spcBef>
+                <a:spcPts val="0"/>
+              </a:spcBef>
+              <a:spcAft>
+                <a:spcPts val="0"/>
+              </a:spcAft>
+            </a:pPr>
+            <a:r>
+              <a:rPr sz="1000" b="0">
+                <a:solidFill>
+                  <a:srgbClr val="94A3B8"/>
+                </a:solidFill>
+                <a:latin typeface="Calibri"/>
+              </a:rPr>
+              <a:t>Takuya Sato — Founder, TokiStorage</a:t>
+            </a:r>
+          </a:p>
+        </p:txBody>
+      </p:sp>
+      <p:sp>
+        <p:nvSpPr>
+          <p:cNvPr id="22" name="Rectangle 21"/>
+          <p:cNvSpPr/>
+          <p:nvPr/>
+        </p:nvSpPr>
+        <p:spPr>
+          <a:xfrm>
+            <a:off x="0" y="4613148"/>
+            <a:ext cx="9144000" cy="6350"/>
+          </a:xfrm>
+          <a:prstGeom prst="rect">
+            <a:avLst/>
+          </a:prstGeom>
+          <a:solidFill>
+            <a:srgbClr val="334455"/>
+          </a:solidFill>
+          <a:ln>
+            <a:noFill/>
+          </a:ln>
+        </p:spPr>
+        <p:style>
+          <a:lnRef idx="1">
+            <a:schemeClr val="accent1"/>
+          </a:lnRef>
+          <a:fillRef idx="3">
+            <a:schemeClr val="accent1"/>
+          </a:fillRef>
+          <a:effectRef idx="2">
+            <a:schemeClr val="accent1"/>
+          </a:effectRef>
+          <a:fontRef idx="minor">
+            <a:schemeClr val="lt1"/>
+          </a:fontRef>
+        </p:style>
+        <p:txBody>
+          <a:bodyPr rtlCol="0" anchor="ctr"/>
+          <a:lstStyle/>
+          <a:p>
+            <a:pPr algn="ctr"/>
+          </a:p>
+        </p:txBody>
+      </p:sp>
+      <p:sp>
+        <p:nvSpPr>
+          <p:cNvPr id="23" name="TextBox 22"/>
+          <p:cNvSpPr txBox="1"/>
+          <p:nvPr/>
+        </p:nvSpPr>
+        <p:spPr>
+          <a:xfrm>
+            <a:off x="457200" y="4640580"/>
+            <a:ext cx="3657600" cy="320040"/>
+          </a:xfrm>
+          <a:prstGeom prst="rect">
+            <a:avLst/>
+          </a:prstGeom>
+          <a:noFill/>
+        </p:spPr>
+        <p:txBody>
+          <a:bodyPr wrap="square"/>
+          <a:lstStyle/>
+          <a:p>
+            <a:pPr algn="l">
+              <a:lnSpc>
+                <a:spcPct val="135000"/>
+              </a:lnSpc>
+              <a:spcBef>
+                <a:spcPts val="0"/>
+              </a:spcBef>
+              <a:spcAft>
+                <a:spcPts val="0"/>
+              </a:spcAft>
+            </a:pPr>
+            <a:r>
               <a:rPr sz="900" b="0">
                 <a:solidFill>
                   <a:srgbClr val="94A3B8"/>
@@ -11796,14 +13055,14 @@
       </p:sp>
       <p:sp>
         <p:nvSpPr>
-          <p:cNvPr id="9" name="TextBox 8"/>
-          <p:cNvSpPr txBox="1"/>
-          <p:nvPr/>
-        </p:nvSpPr>
-        <p:spPr>
-          <a:xfrm>
-            <a:off x="3657600" y="4821428"/>
-            <a:ext cx="1828800" cy="274320"/>
+          <p:cNvPr id="24" name="TextBox 23"/>
+          <p:cNvSpPr txBox="1"/>
+          <p:nvPr/>
+        </p:nvSpPr>
+        <p:spPr>
+          <a:xfrm>
+            <a:off x="3657600" y="4640580"/>
+            <a:ext cx="1828800" cy="320040"/>
           </a:xfrm>
           <a:prstGeom prst="rect">
             <a:avLst/>
@@ -11839,14 +13098,14 @@
       </p:sp>
       <p:sp>
         <p:nvSpPr>
-          <p:cNvPr id="10" name="TextBox 9"/>
-          <p:cNvSpPr txBox="1"/>
-          <p:nvPr/>
-        </p:nvSpPr>
-        <p:spPr>
-          <a:xfrm>
-            <a:off x="8229600" y="4821428"/>
-            <a:ext cx="457200" cy="274320"/>
+          <p:cNvPr id="25" name="TextBox 24"/>
+          <p:cNvSpPr txBox="1"/>
+          <p:nvPr/>
+        </p:nvSpPr>
+        <p:spPr>
+          <a:xfrm>
+            <a:off x="8229600" y="4640580"/>
+            <a:ext cx="457200" cy="320040"/>
           </a:xfrm>
           <a:prstGeom prst="rect">
             <a:avLst/>

</xml_diff>

<commit_message>
Fix Sado wording in PDF generators and regenerate all PDFs
Update EN deck generators (client-deck, partnership-deck) to replace
"Relocating to Sado Island" with "Establishing base on Sado Island".
Regenerate all auto-generated PDFs (government docs, client deck,
partnership deck). matsuo-proposal.pdf is a manual import and cannot
be auto-updated.

Co-Authored-By: Claude Opus 4.6 <noreply@anthropic.com>
</commit_message>
<xml_diff>
--- a/tokistorage-client-deck-en.pptx
+++ b/tokistorage-client-deck-en.pptx
@@ -10040,7 +10040,7 @@
                 </a:solidFill>
                 <a:latin typeface="Calibri"/>
               </a:rPr>
-              <a:t>Experience three-layer storage with A4 laminate. Voice QR → laminate + NDL deposit + GitHub. Start here.</a:t>
+              <a:t>Experience three-layer storage with A4 laminate. TokiQR → laminate + NDL deposit + GitHub. Start here.</a:t>
             </a:r>
           </a:p>
         </p:txBody>
@@ -11662,7 +11662,7 @@
         <p:spPr>
           <a:xfrm>
             <a:off x="457200" y="3419856"/>
-            <a:ext cx="3086100" cy="347472"/>
+            <a:ext cx="2606040" cy="347472"/>
           </a:xfrm>
           <a:prstGeom prst="rect">
             <a:avLst/>
@@ -11707,7 +11707,7 @@
         <p:spPr>
           <a:xfrm>
             <a:off x="548640" y="3419856"/>
-            <a:ext cx="2903220" cy="347472"/>
+            <a:ext cx="2423160" cy="347472"/>
           </a:xfrm>
           <a:prstGeom prst="rect">
             <a:avLst/>
@@ -11736,7 +11736,7 @@
                 </a:solidFill>
                 <a:latin typeface="Calibri"/>
               </a:rPr>
-              <a:t>Relocating to Sado Island (Spring 2026)</a:t>
+              <a:t>Establishing base on Sado Island</a:t>
             </a:r>
           </a:p>
         </p:txBody>
@@ -11749,7 +11749,7 @@
         </p:nvSpPr>
         <p:spPr>
           <a:xfrm>
-            <a:off x="3653028" y="3419856"/>
+            <a:off x="3172968" y="3419856"/>
             <a:ext cx="2606040" cy="347472"/>
           </a:xfrm>
           <a:prstGeom prst="rect">
@@ -11794,7 +11794,7 @@
         </p:nvSpPr>
         <p:spPr>
           <a:xfrm>
-            <a:off x="3744468" y="3419856"/>
+            <a:off x="3264408" y="3419856"/>
             <a:ext cx="2423160" cy="347472"/>
           </a:xfrm>
           <a:prstGeom prst="rect">

</xml_diff>

<commit_message>
Remove trial/individual plans from client deck PDF
Match HTML changes: remove Trial (¥5,000) and Individual (¥50,000)
plans from the pricing slide. Keep Three-Generation and Timeless
Transformation only, with a self-service note for TokiQR/Laminate/
Quartz Glass.

Co-Authored-By: Claude Opus 4.6 <noreply@anthropic.com>
</commit_message>
<xml_diff>
--- a/tokistorage-client-deck-en.pptx
+++ b/tokistorage-client-deck-en.pptx
@@ -9780,7 +9780,7 @@
                 </a:solidFill>
                 <a:latin typeface="Calibri"/>
               </a:rPr>
-              <a:t>Starting from ¥5,000 ($33) — begin in whatever way feels right for you</a:t>
+              <a:t>A deeper proof of existence through dialogue. Timeless Consulting pricing.</a:t>
             </a:r>
           </a:p>
         </p:txBody>
@@ -9836,8 +9836,137 @@
         </p:nvSpPr>
         <p:spPr>
           <a:xfrm>
-            <a:off x="457200" y="1097280"/>
-            <a:ext cx="7863840" cy="804672"/>
+            <a:off x="457200" y="1051560"/>
+            <a:ext cx="7863840" cy="502920"/>
+          </a:xfrm>
+          <a:prstGeom prst="rect">
+            <a:avLst/>
+          </a:prstGeom>
+          <a:solidFill>
+            <a:srgbClr val="EFF6FF"/>
+          </a:solidFill>
+          <a:ln>
+            <a:noFill/>
+          </a:ln>
+        </p:spPr>
+        <p:style>
+          <a:lnRef idx="1">
+            <a:schemeClr val="accent1"/>
+          </a:lnRef>
+          <a:fillRef idx="3">
+            <a:schemeClr val="accent1"/>
+          </a:fillRef>
+          <a:effectRef idx="2">
+            <a:schemeClr val="accent1"/>
+          </a:effectRef>
+          <a:fontRef idx="minor">
+            <a:schemeClr val="lt1"/>
+          </a:fontRef>
+        </p:style>
+        <p:txBody>
+          <a:bodyPr rtlCol="0" anchor="ctr"/>
+          <a:lstStyle/>
+          <a:p>
+            <a:pPr algn="ctr"/>
+          </a:p>
+        </p:txBody>
+      </p:sp>
+      <p:sp>
+        <p:nvSpPr>
+          <p:cNvPr id="6" name="Rectangle 5"/>
+          <p:cNvSpPr/>
+          <p:nvPr/>
+        </p:nvSpPr>
+        <p:spPr>
+          <a:xfrm>
+            <a:off x="457200" y="1051560"/>
+            <a:ext cx="54864" cy="502920"/>
+          </a:xfrm>
+          <a:prstGeom prst="rect">
+            <a:avLst/>
+          </a:prstGeom>
+          <a:solidFill>
+            <a:srgbClr val="2563EB"/>
+          </a:solidFill>
+          <a:ln>
+            <a:noFill/>
+          </a:ln>
+        </p:spPr>
+        <p:style>
+          <a:lnRef idx="1">
+            <a:schemeClr val="accent1"/>
+          </a:lnRef>
+          <a:fillRef idx="3">
+            <a:schemeClr val="accent1"/>
+          </a:fillRef>
+          <a:effectRef idx="2">
+            <a:schemeClr val="accent1"/>
+          </a:effectRef>
+          <a:fontRef idx="minor">
+            <a:schemeClr val="lt1"/>
+          </a:fontRef>
+        </p:style>
+        <p:txBody>
+          <a:bodyPr rtlCol="0" anchor="ctr"/>
+          <a:lstStyle/>
+          <a:p>
+            <a:pPr algn="ctr"/>
+          </a:p>
+        </p:txBody>
+      </p:sp>
+      <p:sp>
+        <p:nvSpPr>
+          <p:cNvPr id="7" name="TextBox 6"/>
+          <p:cNvSpPr txBox="1"/>
+          <p:nvPr/>
+        </p:nvSpPr>
+        <p:spPr>
+          <a:xfrm>
+            <a:off x="685800" y="1097280"/>
+            <a:ext cx="7543800" cy="411480"/>
+          </a:xfrm>
+          <a:prstGeom prst="rect">
+            <a:avLst/>
+          </a:prstGeom>
+          <a:noFill/>
+        </p:spPr>
+        <p:txBody>
+          <a:bodyPr wrap="square" anchor="ctr"/>
+          <a:lstStyle/>
+          <a:p>
+            <a:pPr algn="l">
+              <a:lnSpc>
+                <a:spcPct val="135000"/>
+              </a:lnSpc>
+              <a:spcBef>
+                <a:spcPts val="0"/>
+              </a:spcBef>
+              <a:spcAft>
+                <a:spcPts val="0"/>
+              </a:spcAft>
+            </a:pPr>
+            <a:r>
+              <a:rPr sz="1000" b="0">
+                <a:solidFill>
+                  <a:srgbClr val="475569"/>
+                </a:solidFill>
+                <a:latin typeface="Calibri"/>
+              </a:rPr>
+              <a:t>TokiQR (free), UV Laminate QR (¥5,000), and Quartz Glass (¥50,000) are also available as self-service.</a:t>
+            </a:r>
+          </a:p>
+        </p:txBody>
+      </p:sp>
+      <p:sp>
+        <p:nvSpPr>
+          <p:cNvPr id="8" name="Rectangle 7"/>
+          <p:cNvSpPr/>
+          <p:nvPr/>
+        </p:nvSpPr>
+        <p:spPr>
+          <a:xfrm>
+            <a:off x="457200" y="1691640"/>
+            <a:ext cx="7863840" cy="1005840"/>
           </a:xfrm>
           <a:prstGeom prst="rect">
             <a:avLst/>
@@ -9875,20 +10004,20 @@
       </p:sp>
       <p:sp>
         <p:nvSpPr>
-          <p:cNvPr id="6" name="Rectangle 5"/>
+          <p:cNvPr id="9" name="Rectangle 8"/>
           <p:cNvSpPr/>
           <p:nvPr/>
         </p:nvSpPr>
         <p:spPr>
           <a:xfrm>
-            <a:off x="594360" y="1234440"/>
+            <a:off x="594360" y="1828800"/>
             <a:ext cx="457200" cy="457200"/>
           </a:xfrm>
           <a:prstGeom prst="rect">
             <a:avLst/>
           </a:prstGeom>
           <a:solidFill>
-            <a:srgbClr val="EFF6FF"/>
+            <a:srgbClr val="FDF8E8"/>
           </a:solidFill>
           <a:ln>
             <a:noFill/>
@@ -9918,13 +10047,13 @@
       </p:sp>
       <p:sp>
         <p:nvSpPr>
-          <p:cNvPr id="7" name="TextBox 6"/>
-          <p:cNvSpPr txBox="1"/>
-          <p:nvPr/>
-        </p:nvSpPr>
-        <p:spPr>
-          <a:xfrm>
-            <a:off x="594360" y="1234440"/>
+          <p:cNvPr id="10" name="TextBox 9"/>
+          <p:cNvSpPr txBox="1"/>
+          <p:nvPr/>
+        </p:nvSpPr>
+        <p:spPr>
+          <a:xfrm>
+            <a:off x="594360" y="1828800"/>
             <a:ext cx="457200" cy="457200"/>
           </a:xfrm>
           <a:prstGeom prst="rect">
@@ -9954,20 +10083,20 @@
                 </a:solidFill>
                 <a:latin typeface="Calibri"/>
               </a:rPr>
-              <a:t>T</a:t>
-            </a:r>
-          </a:p>
-        </p:txBody>
-      </p:sp>
-      <p:sp>
-        <p:nvSpPr>
-          <p:cNvPr id="8" name="TextBox 7"/>
-          <p:cNvSpPr txBox="1"/>
-          <p:nvPr/>
-        </p:nvSpPr>
-        <p:spPr>
-          <a:xfrm>
-            <a:off x="1188720" y="1207008"/>
+              <a:t>F</a:t>
+            </a:r>
+          </a:p>
+        </p:txBody>
+      </p:sp>
+      <p:sp>
+        <p:nvSpPr>
+          <p:cNvPr id="11" name="TextBox 10"/>
+          <p:cNvSpPr txBox="1"/>
+          <p:nvPr/>
+        </p:nvSpPr>
+        <p:spPr>
+          <a:xfrm>
+            <a:off x="1188720" y="1801368"/>
             <a:ext cx="6949440" cy="292608"/>
           </a:xfrm>
           <a:prstGeom prst="rect">
@@ -9997,21 +10126,21 @@
                 </a:solidFill>
                 <a:latin typeface="Calibri"/>
               </a:rPr>
-              <a:t>Trial Plan — ¥5,000 ($33)</a:t>
-            </a:r>
-          </a:p>
-        </p:txBody>
-      </p:sp>
-      <p:sp>
-        <p:nvSpPr>
-          <p:cNvPr id="9" name="TextBox 8"/>
-          <p:cNvSpPr txBox="1"/>
-          <p:nvPr/>
-        </p:nvSpPr>
-        <p:spPr>
-          <a:xfrm>
-            <a:off x="1188720" y="1517904"/>
-            <a:ext cx="6949440" cy="274320"/>
+              <a:t>Three-Generation — ¥550,000 ($3,600, recommended)</a:t>
+            </a:r>
+          </a:p>
+        </p:txBody>
+      </p:sp>
+      <p:sp>
+        <p:nvSpPr>
+          <p:cNvPr id="12" name="TextBox 11"/>
+          <p:cNvSpPr txBox="1"/>
+          <p:nvPr/>
+        </p:nvSpPr>
+        <p:spPr>
+          <a:xfrm>
+            <a:off x="1188720" y="2112264"/>
+            <a:ext cx="6949440" cy="475488"/>
           </a:xfrm>
           <a:prstGeom prst="rect">
             <a:avLst/>
@@ -10040,21 +10169,21 @@
                 </a:solidFill>
                 <a:latin typeface="Calibri"/>
               </a:rPr>
-              <a:t>Experience three-layer storage with A4 laminate. TokiQR → laminate + NDL deposit + GitHub. Start here.</a:t>
-            </a:r>
-          </a:p>
-        </p:txBody>
-      </p:sp>
-      <p:sp>
-        <p:nvSpPr>
-          <p:cNvPr id="10" name="Rectangle 9"/>
+              <a:t>Three family members + on-site inscription on Sado Island. An alternative to traditional graves.</a:t>
+            </a:r>
+          </a:p>
+        </p:txBody>
+      </p:sp>
+      <p:sp>
+        <p:nvSpPr>
+          <p:cNvPr id="13" name="Rectangle 12"/>
           <p:cNvSpPr/>
           <p:nvPr/>
         </p:nvSpPr>
         <p:spPr>
           <a:xfrm>
-            <a:off x="457200" y="1993392"/>
-            <a:ext cx="7863840" cy="804672"/>
+            <a:off x="457200" y="2834640"/>
+            <a:ext cx="7863840" cy="1005840"/>
           </a:xfrm>
           <a:prstGeom prst="rect">
             <a:avLst/>
@@ -10092,447 +10221,13 @@
       </p:sp>
       <p:sp>
         <p:nvSpPr>
-          <p:cNvPr id="11" name="Rectangle 10"/>
+          <p:cNvPr id="14" name="Rectangle 13"/>
           <p:cNvSpPr/>
           <p:nvPr/>
         </p:nvSpPr>
         <p:spPr>
           <a:xfrm>
-            <a:off x="594360" y="2130552"/>
-            <a:ext cx="457200" cy="457200"/>
-          </a:xfrm>
-          <a:prstGeom prst="rect">
-            <a:avLst/>
-          </a:prstGeom>
-          <a:solidFill>
-            <a:srgbClr val="EFF6FF"/>
-          </a:solidFill>
-          <a:ln>
-            <a:noFill/>
-          </a:ln>
-        </p:spPr>
-        <p:style>
-          <a:lnRef idx="1">
-            <a:schemeClr val="accent1"/>
-          </a:lnRef>
-          <a:fillRef idx="3">
-            <a:schemeClr val="accent1"/>
-          </a:fillRef>
-          <a:effectRef idx="2">
-            <a:schemeClr val="accent1"/>
-          </a:effectRef>
-          <a:fontRef idx="minor">
-            <a:schemeClr val="lt1"/>
-          </a:fontRef>
-        </p:style>
-        <p:txBody>
-          <a:bodyPr rtlCol="0" anchor="ctr"/>
-          <a:lstStyle/>
-          <a:p>
-            <a:pPr algn="ctr"/>
-          </a:p>
-        </p:txBody>
-      </p:sp>
-      <p:sp>
-        <p:nvSpPr>
-          <p:cNvPr id="12" name="TextBox 11"/>
-          <p:cNvSpPr txBox="1"/>
-          <p:nvPr/>
-        </p:nvSpPr>
-        <p:spPr>
-          <a:xfrm>
-            <a:off x="594360" y="2130552"/>
-            <a:ext cx="457200" cy="457200"/>
-          </a:xfrm>
-          <a:prstGeom prst="rect">
-            <a:avLst/>
-          </a:prstGeom>
-          <a:noFill/>
-        </p:spPr>
-        <p:txBody>
-          <a:bodyPr wrap="square" anchor="ctr"/>
-          <a:lstStyle/>
-          <a:p>
-            <a:pPr algn="ctr">
-              <a:lnSpc>
-                <a:spcPct val="135000"/>
-              </a:lnSpc>
-              <a:spcBef>
-                <a:spcPts val="0"/>
-              </a:spcBef>
-              <a:spcAft>
-                <a:spcPts val="0"/>
-              </a:spcAft>
-            </a:pPr>
-            <a:r>
-              <a:rPr sz="1400" b="1">
-                <a:solidFill>
-                  <a:srgbClr val="2563EB"/>
-                </a:solidFill>
-                <a:latin typeface="Calibri"/>
-              </a:rPr>
-              <a:t>Q</a:t>
-            </a:r>
-          </a:p>
-        </p:txBody>
-      </p:sp>
-      <p:sp>
-        <p:nvSpPr>
-          <p:cNvPr id="13" name="TextBox 12"/>
-          <p:cNvSpPr txBox="1"/>
-          <p:nvPr/>
-        </p:nvSpPr>
-        <p:spPr>
-          <a:xfrm>
-            <a:off x="1188720" y="2103120"/>
-            <a:ext cx="6949440" cy="292608"/>
-          </a:xfrm>
-          <a:prstGeom prst="rect">
-            <a:avLst/>
-          </a:prstGeom>
-          <a:noFill/>
-        </p:spPr>
-        <p:txBody>
-          <a:bodyPr wrap="square"/>
-          <a:lstStyle/>
-          <a:p>
-            <a:pPr algn="l">
-              <a:lnSpc>
-                <a:spcPct val="135000"/>
-              </a:lnSpc>
-              <a:spcBef>
-                <a:spcPts val="0"/>
-              </a:spcBef>
-              <a:spcAft>
-                <a:spcPts val="0"/>
-              </a:spcAft>
-            </a:pPr>
-            <a:r>
-              <a:rPr sz="1100" b="1">
-                <a:solidFill>
-                  <a:srgbClr val="1E293B"/>
-                </a:solidFill>
-                <a:latin typeface="Calibri"/>
-              </a:rPr>
-              <a:t>Individual Plan — ¥50,000 ($330)</a:t>
-            </a:r>
-          </a:p>
-        </p:txBody>
-      </p:sp>
-      <p:sp>
-        <p:nvSpPr>
-          <p:cNvPr id="14" name="TextBox 13"/>
-          <p:cNvSpPr txBox="1"/>
-          <p:nvPr/>
-        </p:nvSpPr>
-        <p:spPr>
-          <a:xfrm>
-            <a:off x="1188720" y="2414016"/>
-            <a:ext cx="6949440" cy="274320"/>
-          </a:xfrm>
-          <a:prstGeom prst="rect">
-            <a:avLst/>
-          </a:prstGeom>
-          <a:noFill/>
-        </p:spPr>
-        <p:txBody>
-          <a:bodyPr wrap="square"/>
-          <a:lstStyle/>
-          <a:p>
-            <a:pPr algn="l">
-              <a:lnSpc>
-                <a:spcPct val="135000"/>
-              </a:lnSpc>
-              <a:spcBef>
-                <a:spcPts val="0"/>
-              </a:spcBef>
-              <a:spcAft>
-                <a:spcPts val="0"/>
-              </a:spcAft>
-            </a:pPr>
-            <a:r>
-              <a:rPr sz="1000" b="0">
-                <a:solidFill>
-                  <a:srgbClr val="475569"/>
-                </a:solidFill>
-                <a:latin typeface="Calibri"/>
-              </a:rPr>
-              <a:t>Inscribed on quartz glass. ¥50 per year for proof of existence. 1,000-year durability (theoretical).</a:t>
-            </a:r>
-          </a:p>
-        </p:txBody>
-      </p:sp>
-      <p:sp>
-        <p:nvSpPr>
-          <p:cNvPr id="15" name="Rectangle 14"/>
-          <p:cNvSpPr/>
-          <p:nvPr/>
-        </p:nvSpPr>
-        <p:spPr>
-          <a:xfrm>
-            <a:off x="457200" y="2889504"/>
-            <a:ext cx="7863840" cy="804672"/>
-          </a:xfrm>
-          <a:prstGeom prst="rect">
-            <a:avLst/>
-          </a:prstGeom>
-          <a:solidFill>
-            <a:srgbClr val="FFFFFF"/>
-          </a:solidFill>
-          <a:ln w="9525">
-            <a:solidFill>
-              <a:srgbClr val="E2E8F0"/>
-            </a:solidFill>
-          </a:ln>
-        </p:spPr>
-        <p:style>
-          <a:lnRef idx="1">
-            <a:schemeClr val="accent1"/>
-          </a:lnRef>
-          <a:fillRef idx="3">
-            <a:schemeClr val="accent1"/>
-          </a:fillRef>
-          <a:effectRef idx="2">
-            <a:schemeClr val="accent1"/>
-          </a:effectRef>
-          <a:fontRef idx="minor">
-            <a:schemeClr val="lt1"/>
-          </a:fontRef>
-        </p:style>
-        <p:txBody>
-          <a:bodyPr rtlCol="0" anchor="ctr"/>
-          <a:lstStyle/>
-          <a:p>
-            <a:pPr algn="ctr"/>
-          </a:p>
-        </p:txBody>
-      </p:sp>
-      <p:sp>
-        <p:nvSpPr>
-          <p:cNvPr id="16" name="Rectangle 15"/>
-          <p:cNvSpPr/>
-          <p:nvPr/>
-        </p:nvSpPr>
-        <p:spPr>
-          <a:xfrm>
-            <a:off x="594360" y="3026664"/>
-            <a:ext cx="457200" cy="457200"/>
-          </a:xfrm>
-          <a:prstGeom prst="rect">
-            <a:avLst/>
-          </a:prstGeom>
-          <a:solidFill>
-            <a:srgbClr val="FDF8E8"/>
-          </a:solidFill>
-          <a:ln>
-            <a:noFill/>
-          </a:ln>
-        </p:spPr>
-        <p:style>
-          <a:lnRef idx="1">
-            <a:schemeClr val="accent1"/>
-          </a:lnRef>
-          <a:fillRef idx="3">
-            <a:schemeClr val="accent1"/>
-          </a:fillRef>
-          <a:effectRef idx="2">
-            <a:schemeClr val="accent1"/>
-          </a:effectRef>
-          <a:fontRef idx="minor">
-            <a:schemeClr val="lt1"/>
-          </a:fontRef>
-        </p:style>
-        <p:txBody>
-          <a:bodyPr rtlCol="0" anchor="ctr"/>
-          <a:lstStyle/>
-          <a:p>
-            <a:pPr algn="ctr"/>
-          </a:p>
-        </p:txBody>
-      </p:sp>
-      <p:sp>
-        <p:nvSpPr>
-          <p:cNvPr id="17" name="TextBox 16"/>
-          <p:cNvSpPr txBox="1"/>
-          <p:nvPr/>
-        </p:nvSpPr>
-        <p:spPr>
-          <a:xfrm>
-            <a:off x="594360" y="3026664"/>
-            <a:ext cx="457200" cy="457200"/>
-          </a:xfrm>
-          <a:prstGeom prst="rect">
-            <a:avLst/>
-          </a:prstGeom>
-          <a:noFill/>
-        </p:spPr>
-        <p:txBody>
-          <a:bodyPr wrap="square" anchor="ctr"/>
-          <a:lstStyle/>
-          <a:p>
-            <a:pPr algn="ctr">
-              <a:lnSpc>
-                <a:spcPct val="135000"/>
-              </a:lnSpc>
-              <a:spcBef>
-                <a:spcPts val="0"/>
-              </a:spcBef>
-              <a:spcAft>
-                <a:spcPts val="0"/>
-              </a:spcAft>
-            </a:pPr>
-            <a:r>
-              <a:rPr sz="1400" b="1">
-                <a:solidFill>
-                  <a:srgbClr val="2563EB"/>
-                </a:solidFill>
-                <a:latin typeface="Calibri"/>
-              </a:rPr>
-              <a:t>F</a:t>
-            </a:r>
-          </a:p>
-        </p:txBody>
-      </p:sp>
-      <p:sp>
-        <p:nvSpPr>
-          <p:cNvPr id="18" name="TextBox 17"/>
-          <p:cNvSpPr txBox="1"/>
-          <p:nvPr/>
-        </p:nvSpPr>
-        <p:spPr>
-          <a:xfrm>
-            <a:off x="1188720" y="2999232"/>
-            <a:ext cx="6949440" cy="292608"/>
-          </a:xfrm>
-          <a:prstGeom prst="rect">
-            <a:avLst/>
-          </a:prstGeom>
-          <a:noFill/>
-        </p:spPr>
-        <p:txBody>
-          <a:bodyPr wrap="square"/>
-          <a:lstStyle/>
-          <a:p>
-            <a:pPr algn="l">
-              <a:lnSpc>
-                <a:spcPct val="135000"/>
-              </a:lnSpc>
-              <a:spcBef>
-                <a:spcPts val="0"/>
-              </a:spcBef>
-              <a:spcAft>
-                <a:spcPts val="0"/>
-              </a:spcAft>
-            </a:pPr>
-            <a:r>
-              <a:rPr sz="1100" b="1">
-                <a:solidFill>
-                  <a:srgbClr val="1E293B"/>
-                </a:solidFill>
-                <a:latin typeface="Calibri"/>
-              </a:rPr>
-              <a:t>Three-Generation — ¥550,000 ($3,600, recommended)</a:t>
-            </a:r>
-          </a:p>
-        </p:txBody>
-      </p:sp>
-      <p:sp>
-        <p:nvSpPr>
-          <p:cNvPr id="19" name="TextBox 18"/>
-          <p:cNvSpPr txBox="1"/>
-          <p:nvPr/>
-        </p:nvSpPr>
-        <p:spPr>
-          <a:xfrm>
-            <a:off x="1188720" y="3310128"/>
-            <a:ext cx="6949440" cy="274320"/>
-          </a:xfrm>
-          <a:prstGeom prst="rect">
-            <a:avLst/>
-          </a:prstGeom>
-          <a:noFill/>
-        </p:spPr>
-        <p:txBody>
-          <a:bodyPr wrap="square"/>
-          <a:lstStyle/>
-          <a:p>
-            <a:pPr algn="l">
-              <a:lnSpc>
-                <a:spcPct val="135000"/>
-              </a:lnSpc>
-              <a:spcBef>
-                <a:spcPts val="0"/>
-              </a:spcBef>
-              <a:spcAft>
-                <a:spcPts val="0"/>
-              </a:spcAft>
-            </a:pPr>
-            <a:r>
-              <a:rPr sz="1000" b="0">
-                <a:solidFill>
-                  <a:srgbClr val="475569"/>
-                </a:solidFill>
-                <a:latin typeface="Calibri"/>
-              </a:rPr>
-              <a:t>Three family members + on-site inscription on Sado Island. An alternative to traditional graves.</a:t>
-            </a:r>
-          </a:p>
-        </p:txBody>
-      </p:sp>
-      <p:sp>
-        <p:nvSpPr>
-          <p:cNvPr id="20" name="Rectangle 19"/>
-          <p:cNvSpPr/>
-          <p:nvPr/>
-        </p:nvSpPr>
-        <p:spPr>
-          <a:xfrm>
-            <a:off x="457200" y="3785616"/>
-            <a:ext cx="7863840" cy="804672"/>
-          </a:xfrm>
-          <a:prstGeom prst="rect">
-            <a:avLst/>
-          </a:prstGeom>
-          <a:solidFill>
-            <a:srgbClr val="FFFFFF"/>
-          </a:solidFill>
-          <a:ln w="9525">
-            <a:solidFill>
-              <a:srgbClr val="E2E8F0"/>
-            </a:solidFill>
-          </a:ln>
-        </p:spPr>
-        <p:style>
-          <a:lnRef idx="1">
-            <a:schemeClr val="accent1"/>
-          </a:lnRef>
-          <a:fillRef idx="3">
-            <a:schemeClr val="accent1"/>
-          </a:fillRef>
-          <a:effectRef idx="2">
-            <a:schemeClr val="accent1"/>
-          </a:effectRef>
-          <a:fontRef idx="minor">
-            <a:schemeClr val="lt1"/>
-          </a:fontRef>
-        </p:style>
-        <p:txBody>
-          <a:bodyPr rtlCol="0" anchor="ctr"/>
-          <a:lstStyle/>
-          <a:p>
-            <a:pPr algn="ctr"/>
-          </a:p>
-        </p:txBody>
-      </p:sp>
-      <p:sp>
-        <p:nvSpPr>
-          <p:cNvPr id="21" name="Rectangle 20"/>
-          <p:cNvSpPr/>
-          <p:nvPr/>
-        </p:nvSpPr>
-        <p:spPr>
-          <a:xfrm>
-            <a:off x="594360" y="3922776"/>
+            <a:off x="594360" y="2971800"/>
             <a:ext cx="457200" cy="457200"/>
           </a:xfrm>
           <a:prstGeom prst="rect">
@@ -10569,13 +10264,13 @@
       </p:sp>
       <p:sp>
         <p:nvSpPr>
-          <p:cNvPr id="22" name="TextBox 21"/>
-          <p:cNvSpPr txBox="1"/>
-          <p:nvPr/>
-        </p:nvSpPr>
-        <p:spPr>
-          <a:xfrm>
-            <a:off x="594360" y="3922776"/>
+          <p:cNvPr id="15" name="TextBox 14"/>
+          <p:cNvSpPr txBox="1"/>
+          <p:nvPr/>
+        </p:nvSpPr>
+        <p:spPr>
+          <a:xfrm>
+            <a:off x="594360" y="2971800"/>
             <a:ext cx="457200" cy="457200"/>
           </a:xfrm>
           <a:prstGeom prst="rect">
@@ -10612,13 +10307,13 @@
       </p:sp>
       <p:sp>
         <p:nvSpPr>
-          <p:cNvPr id="23" name="TextBox 22"/>
-          <p:cNvSpPr txBox="1"/>
-          <p:nvPr/>
-        </p:nvSpPr>
-        <p:spPr>
-          <a:xfrm>
-            <a:off x="1188720" y="3895344"/>
+          <p:cNvPr id="16" name="TextBox 15"/>
+          <p:cNvSpPr txBox="1"/>
+          <p:nvPr/>
+        </p:nvSpPr>
+        <p:spPr>
+          <a:xfrm>
+            <a:off x="1188720" y="2944368"/>
             <a:ext cx="6949440" cy="292608"/>
           </a:xfrm>
           <a:prstGeom prst="rect">
@@ -10648,21 +10343,21 @@
                 </a:solidFill>
                 <a:latin typeface="Calibri"/>
               </a:rPr>
-              <a:t>Voice Memorial — ¥5,550,000 ($36,500)</a:t>
-            </a:r>
-          </a:p>
-        </p:txBody>
-      </p:sp>
-      <p:sp>
-        <p:nvSpPr>
-          <p:cNvPr id="24" name="TextBox 23"/>
-          <p:cNvSpPr txBox="1"/>
-          <p:nvPr/>
-        </p:nvSpPr>
-        <p:spPr>
-          <a:xfrm>
-            <a:off x="1188720" y="4206240"/>
-            <a:ext cx="6949440" cy="274320"/>
+              <a:t>Timeless Transformation — ¥5,550,000 ($36,500)</a:t>
+            </a:r>
+          </a:p>
+        </p:txBody>
+      </p:sp>
+      <p:sp>
+        <p:nvSpPr>
+          <p:cNvPr id="17" name="TextBox 16"/>
+          <p:cNvSpPr txBox="1"/>
+          <p:nvPr/>
+        </p:nvSpPr>
+        <p:spPr>
+          <a:xfrm>
+            <a:off x="1188720" y="3255264"/>
+            <a:ext cx="6949440" cy="475488"/>
           </a:xfrm>
           <a:prstGeom prst="rect">
             <a:avLst/>
@@ -10698,7 +10393,7 @@
       </p:sp>
       <p:sp>
         <p:nvSpPr>
-          <p:cNvPr id="25" name="Rectangle 24"/>
+          <p:cNvPr id="18" name="Rectangle 17"/>
           <p:cNvSpPr/>
           <p:nvPr/>
         </p:nvSpPr>
@@ -10741,7 +10436,7 @@
       </p:sp>
       <p:sp>
         <p:nvSpPr>
-          <p:cNvPr id="26" name="TextBox 25"/>
+          <p:cNvPr id="19" name="TextBox 18"/>
           <p:cNvSpPr txBox="1"/>
           <p:nvPr/>
         </p:nvSpPr>
@@ -10784,7 +10479,7 @@
       </p:sp>
       <p:sp>
         <p:nvSpPr>
-          <p:cNvPr id="27" name="TextBox 26"/>
+          <p:cNvPr id="20" name="TextBox 19"/>
           <p:cNvSpPr txBox="1"/>
           <p:nvPr/>
         </p:nvSpPr>
@@ -10827,7 +10522,7 @@
       </p:sp>
       <p:sp>
         <p:nvSpPr>
-          <p:cNvPr id="28" name="TextBox 27"/>
+          <p:cNvPr id="21" name="TextBox 20"/>
           <p:cNvSpPr txBox="1"/>
           <p:nvPr/>
         </p:nvSpPr>

</xml_diff>

<commit_message>
Update essay count from 70+ to 100+ across all files
横串チェックで全HTML・Python生成スクリプト・PDF/PPTXを一括更新:
- 16 HTML files (JA/EN): partnership, client-proposal, patronage, infographic, deck, coach, timeless-coach, no-competition
- 3 Python generators: generate-deck.py, generate-client-deck.py, generate-government-docs.py
- All PPTX/PDF regenerated (partnership, client, government)

Co-Authored-By: Claude Opus 4.6 <noreply@anthropic.com>
</commit_message>
<xml_diff>
--- a/tokistorage-client-deck-en.pptx
+++ b/tokistorage-client-deck-en.pptx
@@ -9504,7 +9504,7 @@
                 </a:solidFill>
                 <a:latin typeface="Calibri"/>
               </a:rPr>
-              <a:t>A report placing your proof of existence in the context of 70+ philosophical essays. Intellectual grounding for "why preserve."</a:t>
+              <a:t>A report placing your proof of existence in the context of 100+ philosophical essays. Intellectual grounding for "why preserve."</a:t>
             </a:r>
           </a:p>
         </p:txBody>
@@ -10815,7 +10815,7 @@
                 </a:solidFill>
                 <a:latin typeface="Calibri"/>
               </a:rPr>
-              <a:t>Former Big Four consultant — understands executive dialogue and strategic thinking from the inside. 20+ years in semiconductor manufacturing engineering. Former president of Timeless Town Shin-Urayasu residents' association (250 households). Through SoulCarrier's work with unclaimed graves, witnessed firsthand how memories vanish — and conceived TokiStorage. Validated off-grid, institution-free 1,000-year design through testing in Maui and Lake Yamanakako. Author of 70+ philosophical essays exploring proof of existence across 9 intellectual domains.</a:t>
+              <a:t>Former Big Four consultant — understands executive dialogue and strategic thinking from the inside. 20+ years in semiconductor manufacturing engineering. Former president of Timeless Town Shin-Urayasu residents' association (250 households). Through SoulCarrier's work with unclaimed graves, witnessed firsthand how memories vanish — and conceived TokiStorage. Validated off-grid, institution-free 1,000-year design through testing in Maui and Lake Yamanakako. Author of 100+ philosophical essays exploring proof of existence across 9 intellectual domains.</a:t>
             </a:r>
           </a:p>
         </p:txBody>
@@ -11181,7 +11181,7 @@
         <p:spPr>
           <a:xfrm>
             <a:off x="2281428" y="3035808"/>
-            <a:ext cx="2057400" cy="347472"/>
+            <a:ext cx="2125980" cy="347472"/>
           </a:xfrm>
           <a:prstGeom prst="rect">
             <a:avLst/>
@@ -11226,7 +11226,7 @@
         <p:spPr>
           <a:xfrm>
             <a:off x="2372868" y="3035808"/>
-            <a:ext cx="1874520" cy="347472"/>
+            <a:ext cx="1943100" cy="347472"/>
           </a:xfrm>
           <a:prstGeom prst="rect">
             <a:avLst/>
@@ -11255,7 +11255,7 @@
                 </a:solidFill>
                 <a:latin typeface="Calibri"/>
               </a:rPr>
-              <a:t>70+ philosophical essays</a:t>
+              <a:t>100+ philosophical essays</a:t>
             </a:r>
           </a:p>
         </p:txBody>
@@ -11268,7 +11268,7 @@
         </p:nvSpPr>
         <p:spPr>
           <a:xfrm>
-            <a:off x="4448556" y="3035808"/>
+            <a:off x="4517136" y="3035808"/>
             <a:ext cx="1645919" cy="347472"/>
           </a:xfrm>
           <a:prstGeom prst="rect">
@@ -11313,7 +11313,7 @@
         </p:nvSpPr>
         <p:spPr>
           <a:xfrm>
-            <a:off x="4539996" y="3035808"/>
+            <a:off x="4608576" y="3035808"/>
             <a:ext cx="1463039" cy="347472"/>
           </a:xfrm>
           <a:prstGeom prst="rect">

</xml_diff>

<commit_message>
Update essay count 70+ to 100+ and add Grok to partnership pages
- エッセイ数を70+から100+に全ファイル横串更新 (16 HTML, 3 Python generators)
- partnership.html/en: Grok/xAI追加 (3社→4社), AI引用文をindex.htmlに統一
- All PPTX/PDF regenerated (partnership deck, client deck, government docs)
- 除外: payment.html (Apple Pay 70ヶ国), workaway (170+ countries), 100-scenes (scene #70)

Co-Authored-By: Claude Opus 4.6 <noreply@anthropic.com>
</commit_message>
<xml_diff>
--- a/tokistorage-client-deck-en.pptx
+++ b/tokistorage-client-deck-en.pptx
@@ -9504,7 +9504,7 @@
                 </a:solidFill>
                 <a:latin typeface="Calibri"/>
               </a:rPr>
-              <a:t>A report placing your proof of existence in the context of 70+ philosophical essays. Intellectual grounding for "why preserve."</a:t>
+              <a:t>A report placing your proof of existence in the context of 100+ philosophical essays. Intellectual grounding for "why preserve."</a:t>
             </a:r>
           </a:p>
         </p:txBody>
@@ -10815,7 +10815,7 @@
                 </a:solidFill>
                 <a:latin typeface="Calibri"/>
               </a:rPr>
-              <a:t>Former Big Four consultant — understands executive dialogue and strategic thinking from the inside. 20+ years in semiconductor manufacturing engineering. Former president of Timeless Town Shin-Urayasu residents' association (250 households). Through SoulCarrier's work with unclaimed graves, witnessed firsthand how memories vanish — and conceived TokiStorage. Validated off-grid, institution-free 1,000-year design through testing in Maui and Lake Yamanakako. Author of 70+ philosophical essays exploring proof of existence across 9 intellectual domains.</a:t>
+              <a:t>Former Big Four consultant — understands executive dialogue and strategic thinking from the inside. 20+ years in semiconductor manufacturing engineering. Former president of Timeless Town Shin-Urayasu residents' association (250 households). Through SoulCarrier's work with unclaimed graves, witnessed firsthand how memories vanish — and conceived TokiStorage. Validated off-grid, institution-free 1,000-year design through testing in Maui and Lake Yamanakako. Author of 100+ philosophical essays exploring proof of existence across 9 intellectual domains.</a:t>
             </a:r>
           </a:p>
         </p:txBody>
@@ -11181,7 +11181,7 @@
         <p:spPr>
           <a:xfrm>
             <a:off x="2281428" y="3035808"/>
-            <a:ext cx="2057400" cy="347472"/>
+            <a:ext cx="2125980" cy="347472"/>
           </a:xfrm>
           <a:prstGeom prst="rect">
             <a:avLst/>
@@ -11226,7 +11226,7 @@
         <p:spPr>
           <a:xfrm>
             <a:off x="2372868" y="3035808"/>
-            <a:ext cx="1874520" cy="347472"/>
+            <a:ext cx="1943100" cy="347472"/>
           </a:xfrm>
           <a:prstGeom prst="rect">
             <a:avLst/>
@@ -11255,7 +11255,7 @@
                 </a:solidFill>
                 <a:latin typeface="Calibri"/>
               </a:rPr>
-              <a:t>70+ philosophical essays</a:t>
+              <a:t>100+ philosophical essays</a:t>
             </a:r>
           </a:p>
         </p:txBody>
@@ -11268,7 +11268,7 @@
         </p:nvSpPr>
         <p:spPr>
           <a:xfrm>
-            <a:off x="4448556" y="3035808"/>
+            <a:off x="4517136" y="3035808"/>
             <a:ext cx="1645919" cy="347472"/>
           </a:xfrm>
           <a:prstGeom prst="rect">
@@ -11313,7 +11313,7 @@
         </p:nvSpPr>
         <p:spPr>
           <a:xfrm>
-            <a:off x="4539996" y="3035808"/>
+            <a:off x="4608576" y="3035808"/>
             <a:ext cx="1463039" cy="347472"/>
           </a:xfrm>
           <a:prstGeom prst="rect">

</xml_diff>